<commit_message>
finalized slides for RMCAT slides
</commit_message>
<xml_diff>
--- a/ppt-ietf85-rmcat-cc-eval-00.pptx
+++ b/ppt-ietf85-rmcat-cc-eval-00.pptx
@@ -5,7 +5,7 @@
     <p:sldMasterId id="2147483648" r:id="rId1"/>
   </p:sldMasterIdLst>
   <p:notesMasterIdLst>
-    <p:notesMasterId r:id="rId12"/>
+    <p:notesMasterId r:id="rId11"/>
   </p:notesMasterIdLst>
   <p:sldIdLst>
     <p:sldId id="256" r:id="rId2"/>
@@ -17,7 +17,6 @@
     <p:sldId id="263" r:id="rId8"/>
     <p:sldId id="264" r:id="rId9"/>
     <p:sldId id="265" r:id="rId10"/>
-    <p:sldId id="266" r:id="rId11"/>
   </p:sldIdLst>
   <p:sldSz cx="9144000" cy="6858000" type="screen4x3"/>
   <p:notesSz cx="6858000" cy="9144000"/>
@@ -201,7 +200,7 @@
           <a:p>
             <a:fld id="{74F00AB7-AF39-084A-A0BA-5864F0464E28}" type="datetimeFigureOut">
               <a:rPr lang="en-US" smtClean="0"/>
-              <a:t>11/5/12</a:t>
+              <a:t>11/8/12</a:t>
             </a:fld>
             <a:endParaRPr lang="en-US"/>
           </a:p>
@@ -624,18 +623,7 @@
                 <a:ea typeface="+mn-ea"/>
                 <a:cs typeface="+mn-cs"/>
               </a:rPr>
-              <a:t> </a:t>
-            </a:r>
-            <a:r>
-              <a:rPr lang="en-US" sz="1200" kern="1200" dirty="0" smtClean="0">
-                <a:solidFill>
-                  <a:schemeClr val="tx1"/>
-                </a:solidFill>
-                <a:latin typeface="+mn-lt"/>
-                <a:ea typeface="+mn-ea"/>
-                <a:cs typeface="+mn-cs"/>
-              </a:rPr>
-              <a:t>*  Delay</a:t>
+              <a:t> *  Delay</a:t>
             </a:r>
           </a:p>
           <a:p>
@@ -733,6 +721,111 @@
     <p:extLst>
       <p:ext uri="{BB962C8B-B14F-4D97-AF65-F5344CB8AC3E}">
         <p14:creationId xmlns:p14="http://schemas.microsoft.com/office/powerpoint/2010/main" val="3891322374"/>
+      </p:ext>
+    </p:extLst>
+  </p:cSld>
+  <p:clrMapOvr>
+    <a:masterClrMapping/>
+  </p:clrMapOvr>
+</p:notes>
+</file>
+
+<file path=ppt/notesSlides/notesSlide3.xml><?xml version="1.0" encoding="utf-8"?>
+<p:notes xmlns:a="http://schemas.openxmlformats.org/drawingml/2006/main" xmlns:r="http://schemas.openxmlformats.org/officeDocument/2006/relationships" xmlns:p="http://schemas.openxmlformats.org/presentationml/2006/main">
+  <p:cSld>
+    <p:spTree>
+      <p:nvGrpSpPr>
+        <p:cNvPr id="1" name=""/>
+        <p:cNvGrpSpPr/>
+        <p:nvPr/>
+      </p:nvGrpSpPr>
+      <p:grpSpPr>
+        <a:xfrm>
+          <a:off x="0" y="0"/>
+          <a:ext cx="0" cy="0"/>
+          <a:chOff x="0" y="0"/>
+          <a:chExt cx="0" cy="0"/>
+        </a:xfrm>
+      </p:grpSpPr>
+      <p:sp>
+        <p:nvSpPr>
+          <p:cNvPr id="2" name="Slide Image Placeholder 1"/>
+          <p:cNvSpPr>
+            <a:spLocks noGrp="1" noRot="1" noChangeAspect="1"/>
+          </p:cNvSpPr>
+          <p:nvPr>
+            <p:ph type="sldImg"/>
+          </p:nvPr>
+        </p:nvSpPr>
+        <p:spPr/>
+      </p:sp>
+      <p:sp>
+        <p:nvSpPr>
+          <p:cNvPr id="3" name="Notes Placeholder 2"/>
+          <p:cNvSpPr>
+            <a:spLocks noGrp="1"/>
+          </p:cNvSpPr>
+          <p:nvPr>
+            <p:ph type="body" idx="1"/>
+          </p:nvPr>
+        </p:nvSpPr>
+        <p:spPr/>
+        <p:txBody>
+          <a:bodyPr/>
+          <a:lstStyle/>
+          <a:p>
+            <a:r>
+              <a:rPr lang="en-US" dirty="0" smtClean="0"/>
+              <a:t>Duration of simulation</a:t>
+            </a:r>
+          </a:p>
+          <a:p>
+            <a:r>
+              <a:rPr lang="en-US" dirty="0" smtClean="0"/>
+              <a:t>Packet and bit rates for CBR traffic</a:t>
+            </a:r>
+          </a:p>
+          <a:p>
+            <a:r>
+              <a:rPr lang="en-US" dirty="0" smtClean="0"/>
+              <a:t>How to model TCP short flows</a:t>
+            </a:r>
+          </a:p>
+          <a:p>
+            <a:endParaRPr lang="en-US" dirty="0" smtClean="0"/>
+          </a:p>
+          <a:p>
+            <a:endParaRPr lang="en-US" dirty="0"/>
+          </a:p>
+        </p:txBody>
+      </p:sp>
+      <p:sp>
+        <p:nvSpPr>
+          <p:cNvPr id="4" name="Slide Number Placeholder 3"/>
+          <p:cNvSpPr>
+            <a:spLocks noGrp="1"/>
+          </p:cNvSpPr>
+          <p:nvPr>
+            <p:ph type="sldNum" sz="quarter" idx="10"/>
+          </p:nvPr>
+        </p:nvSpPr>
+        <p:spPr/>
+        <p:txBody>
+          <a:bodyPr/>
+          <a:lstStyle/>
+          <a:p>
+            <a:fld id="{FCBCBC44-197E-3F4D-8A5D-ECFBA1FA5A33}" type="slidenum">
+              <a:rPr lang="en-US" smtClean="0"/>
+              <a:t>9</a:t>
+            </a:fld>
+            <a:endParaRPr lang="en-US"/>
+          </a:p>
+        </p:txBody>
+      </p:sp>
+    </p:spTree>
+    <p:extLst>
+      <p:ext uri="{BB962C8B-B14F-4D97-AF65-F5344CB8AC3E}">
+        <p14:creationId xmlns:p14="http://schemas.microsoft.com/office/powerpoint/2010/main" val="715523878"/>
       </p:ext>
     </p:extLst>
   </p:cSld>
@@ -923,7 +1016,7 @@
           <a:p>
             <a:fld id="{797CEB7D-562C-5E4D-8C0B-7D220ABC0BE1}" type="datetimeFigureOut">
               <a:rPr lang="en-US" smtClean="0"/>
-              <a:t>11/5/12</a:t>
+              <a:t>11/8/12</a:t>
             </a:fld>
             <a:endParaRPr lang="en-US"/>
           </a:p>
@@ -1093,7 +1186,7 @@
           <a:p>
             <a:fld id="{797CEB7D-562C-5E4D-8C0B-7D220ABC0BE1}" type="datetimeFigureOut">
               <a:rPr lang="en-US" smtClean="0"/>
-              <a:t>11/5/12</a:t>
+              <a:t>11/8/12</a:t>
             </a:fld>
             <a:endParaRPr lang="en-US"/>
           </a:p>
@@ -1273,7 +1366,7 @@
           <a:p>
             <a:fld id="{797CEB7D-562C-5E4D-8C0B-7D220ABC0BE1}" type="datetimeFigureOut">
               <a:rPr lang="en-US" smtClean="0"/>
-              <a:t>11/5/12</a:t>
+              <a:t>11/8/12</a:t>
             </a:fld>
             <a:endParaRPr lang="en-US"/>
           </a:p>
@@ -1443,7 +1536,7 @@
           <a:p>
             <a:fld id="{797CEB7D-562C-5E4D-8C0B-7D220ABC0BE1}" type="datetimeFigureOut">
               <a:rPr lang="en-US" smtClean="0"/>
-              <a:t>11/5/12</a:t>
+              <a:t>11/8/12</a:t>
             </a:fld>
             <a:endParaRPr lang="en-US"/>
           </a:p>
@@ -1689,7 +1782,7 @@
           <a:p>
             <a:fld id="{797CEB7D-562C-5E4D-8C0B-7D220ABC0BE1}" type="datetimeFigureOut">
               <a:rPr lang="en-US" smtClean="0"/>
-              <a:t>11/5/12</a:t>
+              <a:t>11/8/12</a:t>
             </a:fld>
             <a:endParaRPr lang="en-US"/>
           </a:p>
@@ -1977,7 +2070,7 @@
           <a:p>
             <a:fld id="{797CEB7D-562C-5E4D-8C0B-7D220ABC0BE1}" type="datetimeFigureOut">
               <a:rPr lang="en-US" smtClean="0"/>
-              <a:t>11/5/12</a:t>
+              <a:t>11/8/12</a:t>
             </a:fld>
             <a:endParaRPr lang="en-US"/>
           </a:p>
@@ -2399,7 +2492,7 @@
           <a:p>
             <a:fld id="{797CEB7D-562C-5E4D-8C0B-7D220ABC0BE1}" type="datetimeFigureOut">
               <a:rPr lang="en-US" smtClean="0"/>
-              <a:t>11/5/12</a:t>
+              <a:t>11/8/12</a:t>
             </a:fld>
             <a:endParaRPr lang="en-US"/>
           </a:p>
@@ -2517,7 +2610,7 @@
           <a:p>
             <a:fld id="{797CEB7D-562C-5E4D-8C0B-7D220ABC0BE1}" type="datetimeFigureOut">
               <a:rPr lang="en-US" smtClean="0"/>
-              <a:t>11/5/12</a:t>
+              <a:t>11/8/12</a:t>
             </a:fld>
             <a:endParaRPr lang="en-US"/>
           </a:p>
@@ -2612,7 +2705,7 @@
           <a:p>
             <a:fld id="{797CEB7D-562C-5E4D-8C0B-7D220ABC0BE1}" type="datetimeFigureOut">
               <a:rPr lang="en-US" smtClean="0"/>
-              <a:t>11/5/12</a:t>
+              <a:t>11/8/12</a:t>
             </a:fld>
             <a:endParaRPr lang="en-US"/>
           </a:p>
@@ -2889,7 +2982,7 @@
           <a:p>
             <a:fld id="{797CEB7D-562C-5E4D-8C0B-7D220ABC0BE1}" type="datetimeFigureOut">
               <a:rPr lang="en-US" smtClean="0"/>
-              <a:t>11/5/12</a:t>
+              <a:t>11/8/12</a:t>
             </a:fld>
             <a:endParaRPr lang="en-US"/>
           </a:p>
@@ -3142,7 +3235,7 @@
           <a:p>
             <a:fld id="{797CEB7D-562C-5E4D-8C0B-7D220ABC0BE1}" type="datetimeFigureOut">
               <a:rPr lang="en-US" smtClean="0"/>
-              <a:t>11/5/12</a:t>
+              <a:t>11/8/12</a:t>
             </a:fld>
             <a:endParaRPr lang="en-US"/>
           </a:p>
@@ -3355,7 +3448,7 @@
           <a:p>
             <a:fld id="{797CEB7D-562C-5E4D-8C0B-7D220ABC0BE1}" type="datetimeFigureOut">
               <a:rPr lang="en-US" smtClean="0"/>
-              <a:t>11/5/12</a:t>
+              <a:t>11/8/12</a:t>
             </a:fld>
             <a:endParaRPr lang="en-US"/>
           </a:p>
@@ -3777,13 +3870,8 @@
           <a:p>
             <a:r>
               <a:rPr lang="en-US" dirty="0" smtClean="0"/>
-              <a:t>draft-singh-rmcat-cc-eval-</a:t>
-            </a:r>
-            <a:r>
-              <a:rPr lang="en-US" dirty="0" smtClean="0"/>
-              <a:t>00</a:t>
-            </a:r>
-            <a:endParaRPr lang="en-US" dirty="0" smtClean="0"/>
+              <a:t>draft-singh-rmcat-cc-eval-00</a:t>
+            </a:r>
           </a:p>
           <a:p>
             <a:r>
@@ -3834,82 +3922,13 @@
   <p:clrMapOvr>
     <a:masterClrMapping/>
   </p:clrMapOvr>
-</p:sld>
-</file>
-
-<file path=ppt/slides/slide10.xml><?xml version="1.0" encoding="utf-8"?>
-<p:sld xmlns:a="http://schemas.openxmlformats.org/drawingml/2006/main" xmlns:r="http://schemas.openxmlformats.org/officeDocument/2006/relationships" xmlns:p="http://schemas.openxmlformats.org/presentationml/2006/main">
-  <p:cSld>
-    <p:spTree>
-      <p:nvGrpSpPr>
-        <p:cNvPr id="1" name=""/>
-        <p:cNvGrpSpPr/>
-        <p:nvPr/>
-      </p:nvGrpSpPr>
-      <p:grpSpPr>
-        <a:xfrm>
-          <a:off x="0" y="0"/>
-          <a:ext cx="0" cy="0"/>
-          <a:chOff x="0" y="0"/>
-          <a:chExt cx="0" cy="0"/>
-        </a:xfrm>
-      </p:grpSpPr>
-      <p:sp>
-        <p:nvSpPr>
-          <p:cNvPr id="2" name="Title 1"/>
-          <p:cNvSpPr>
-            <a:spLocks noGrp="1"/>
-          </p:cNvSpPr>
-          <p:nvPr>
-            <p:ph type="title"/>
-          </p:nvPr>
-        </p:nvSpPr>
-        <p:spPr/>
-        <p:txBody>
-          <a:bodyPr/>
-          <a:lstStyle/>
-          <a:p>
-            <a:r>
-              <a:rPr lang="en-US" dirty="0" smtClean="0"/>
-              <a:t>Next Steps</a:t>
-            </a:r>
-            <a:endParaRPr lang="en-US" dirty="0"/>
-          </a:p>
-        </p:txBody>
-      </p:sp>
-      <p:sp>
-        <p:nvSpPr>
-          <p:cNvPr id="3" name="Content Placeholder 2"/>
-          <p:cNvSpPr>
-            <a:spLocks noGrp="1"/>
-          </p:cNvSpPr>
-          <p:nvPr>
-            <p:ph idx="1"/>
-          </p:nvPr>
-        </p:nvSpPr>
-        <p:spPr/>
-        <p:txBody>
-          <a:bodyPr/>
-          <a:lstStyle/>
-          <a:p>
-            <a:r>
-              <a:rPr lang="en-US" dirty="0" smtClean="0"/>
-              <a:t>Clarify TCP and UDP flow details</a:t>
-            </a:r>
-            <a:endParaRPr lang="en-US" dirty="0"/>
-          </a:p>
-        </p:txBody>
-      </p:sp>
-    </p:spTree>
-    <p:extLst>
-      <p:ext uri="{BB962C8B-B14F-4D97-AF65-F5344CB8AC3E}">
-        <p14:creationId xmlns:p14="http://schemas.microsoft.com/office/powerpoint/2010/main" val="596298751"/>
-      </p:ext>
-    </p:extLst>
-  </p:cSld>
-  <p:clrMapOvr>
-    <a:masterClrMapping/>
-  </p:clrMapOvr>
+  <p:timing>
+    <p:tnLst>
+      <p:par>
+        <p:cTn xmlns:p14="http://schemas.microsoft.com/office/powerpoint/2010/main" id="1" dur="indefinite" restart="never" nodeType="tmRoot"/>
+      </p:par>
+    </p:tnLst>
+  </p:timing>
 </p:sld>
 </file>
 
@@ -4044,6 +4063,13 @@
   <p:clrMapOvr>
     <a:masterClrMapping/>
   </p:clrMapOvr>
+  <p:timing>
+    <p:tnLst>
+      <p:par>
+        <p:cTn xmlns:p14="http://schemas.microsoft.com/office/powerpoint/2010/main" id="1" dur="indefinite" restart="never" nodeType="tmRoot"/>
+      </p:par>
+    </p:tnLst>
+  </p:timing>
 </p:sld>
 </file>
 
@@ -4106,11 +4132,7 @@
           <a:p>
             <a:r>
               <a:rPr lang="en-US" dirty="0" smtClean="0"/>
-              <a:t>Bandwidth </a:t>
-            </a:r>
-            <a:r>
-              <a:rPr lang="en-US" dirty="0" smtClean="0"/>
-              <a:t>Utilization = sending rate/capacity</a:t>
+              <a:t>Bandwidth Utilization = sending rate/capacity</a:t>
             </a:r>
           </a:p>
           <a:p>
@@ -4119,7 +4141,6 @@
               <a:rPr lang="en-US" dirty="0" smtClean="0"/>
               <a:t>Under utilization</a:t>
             </a:r>
-            <a:endParaRPr lang="en-US" dirty="0" smtClean="0"/>
           </a:p>
           <a:p>
             <a:pPr lvl="1"/>
@@ -4132,11 +4153,7 @@
             <a:pPr lvl="1"/>
             <a:r>
               <a:rPr lang="en-US" dirty="0" smtClean="0"/>
-              <a:t>Steady-</a:t>
-            </a:r>
-            <a:r>
-              <a:rPr lang="en-US" dirty="0" smtClean="0"/>
-              <a:t>state</a:t>
+              <a:t>Steady-state</a:t>
             </a:r>
           </a:p>
           <a:p>
@@ -4146,11 +4163,7 @@
           <a:p>
             <a:r>
               <a:rPr lang="en-US" dirty="0" smtClean="0"/>
-              <a:t>Packet loss and discard </a:t>
-            </a:r>
-            <a:r>
-              <a:rPr lang="en-US" dirty="0" smtClean="0"/>
-              <a:t>rate</a:t>
+              <a:t>Packet loss and discard rate</a:t>
             </a:r>
           </a:p>
           <a:p>
@@ -4177,11 +4190,7 @@
           <a:p>
             <a:r>
               <a:rPr lang="en-US" dirty="0" smtClean="0"/>
-              <a:t>Fair </a:t>
-            </a:r>
-            <a:r>
-              <a:rPr lang="en-US" dirty="0" smtClean="0"/>
-              <a:t>share [</a:t>
+              <a:t>Fair share [</a:t>
             </a:r>
             <a:r>
               <a:rPr lang="en-US" dirty="0" smtClean="0">
@@ -4244,11 +4253,7 @@
           <a:p>
             <a:r>
               <a:rPr lang="en-US" dirty="0" smtClean="0"/>
-              <a:t>Measure: min, max, </a:t>
-            </a:r>
-            <a:r>
-              <a:rPr lang="en-US" dirty="0" smtClean="0"/>
-              <a:t>average for the call duration?</a:t>
+              <a:t>Measure: min, max, average for the call duration?</a:t>
             </a:r>
             <a:endParaRPr lang="en-US" dirty="0"/>
           </a:p>
@@ -4264,6 +4269,13 @@
   <p:clrMapOvr>
     <a:masterClrMapping/>
   </p:clrMapOvr>
+  <p:timing>
+    <p:tnLst>
+      <p:par>
+        <p:cTn xmlns:p14="http://schemas.microsoft.com/office/powerpoint/2010/main" id="1" dur="indefinite" restart="never" nodeType="tmRoot"/>
+      </p:par>
+    </p:tnLst>
+  </p:timing>
 </p:sld>
 </file>
 
@@ -4372,29 +4384,28 @@
               <a:buAutoNum type="arabicPeriod"/>
             </a:pPr>
             <a:r>
+              <a:rPr lang="en-US" b="1" dirty="0" smtClean="0"/>
+              <a:t>Media </a:t>
+            </a:r>
+            <a:r>
+              <a:rPr lang="en-US" b="1" dirty="0"/>
+              <a:t>Traffic </a:t>
+            </a:r>
+          </a:p>
+          <a:p>
+            <a:pPr lvl="1"/>
+            <a:r>
+              <a:rPr lang="en-US" b="1" dirty="0" smtClean="0"/>
+              <a:t>Variable motion, series of variable talk spurts</a:t>
+            </a:r>
+          </a:p>
+          <a:p>
+            <a:pPr marL="0" indent="0">
+              <a:buNone/>
+            </a:pPr>
+            <a:r>
               <a:rPr lang="en-US" dirty="0" smtClean="0"/>
-              <a:t>Media </a:t>
-            </a:r>
-            <a:r>
-              <a:rPr lang="en-US" dirty="0"/>
-              <a:t>Traffic </a:t>
-            </a:r>
-          </a:p>
-          <a:p>
-            <a:pPr lvl="1"/>
-            <a:r>
-              <a:rPr lang="en-US" dirty="0" smtClean="0"/>
-              <a:t>Variable motion, series of variable talk spurts</a:t>
-            </a:r>
-          </a:p>
-          <a:p>
-            <a:pPr marL="514350" indent="-514350">
-              <a:buFont typeface="Arial"/>
-              <a:buAutoNum type="arabicPeriod"/>
-            </a:pPr>
-            <a:r>
-              <a:rPr lang="en-US" dirty="0" smtClean="0"/>
-              <a:t>Environments</a:t>
+              <a:t>4-6. Diverse Environments</a:t>
             </a:r>
             <a:endParaRPr lang="en-US" dirty="0"/>
           </a:p>
@@ -4426,8 +4437,8 @@
           </a:p>
           <a:p>
             <a:pPr marL="514350" indent="-514350">
-              <a:buFont typeface="Arial"/>
-              <a:buAutoNum type="arabicPeriod"/>
+              <a:buFont typeface="+mj-lt"/>
+              <a:buAutoNum type="arabicPeriod" startAt="7"/>
             </a:pPr>
             <a:r>
               <a:rPr lang="en-US" dirty="0" smtClean="0"/>
@@ -4441,8 +4452,8 @@
           </a:p>
           <a:p>
             <a:pPr marL="514350" indent="-514350">
-              <a:buFont typeface="Arial"/>
-              <a:buAutoNum type="arabicPeriod"/>
+              <a:buFont typeface="+mj-lt"/>
+              <a:buAutoNum type="arabicPeriod" startAt="7"/>
             </a:pPr>
             <a:r>
               <a:rPr lang="en-US" dirty="0" smtClean="0"/>
@@ -4504,6 +4515,13 @@
   <p:clrMapOvr>
     <a:masterClrMapping/>
   </p:clrMapOvr>
+  <p:timing>
+    <p:tnLst>
+      <p:par>
+        <p:cTn xmlns:p14="http://schemas.microsoft.com/office/powerpoint/2010/main" id="1" dur="indefinite" restart="never" nodeType="tmRoot"/>
+      </p:par>
+    </p:tnLst>
+  </p:timing>
 </p:sld>
 </file>
 
@@ -4661,220 +4679,14 @@
       </p:sp>
       <p:sp>
         <p:nvSpPr>
-          <p:cNvPr id="10" name="Oval 9"/>
-          <p:cNvSpPr/>
-          <p:nvPr/>
-        </p:nvSpPr>
-        <p:spPr>
-          <a:xfrm>
-            <a:off x="3629377" y="3626556"/>
-            <a:ext cx="524933" cy="508000"/>
-          </a:xfrm>
-          <a:prstGeom prst="ellipse">
-            <a:avLst/>
-          </a:prstGeom>
-          <a:ln/>
-        </p:spPr>
-        <p:style>
-          <a:lnRef idx="2">
-            <a:schemeClr val="accent3">
-              <a:shade val="50000"/>
-            </a:schemeClr>
-          </a:lnRef>
-          <a:fillRef idx="1">
-            <a:schemeClr val="accent3"/>
-          </a:fillRef>
-          <a:effectRef idx="0">
-            <a:schemeClr val="accent3"/>
-          </a:effectRef>
-          <a:fontRef idx="minor">
-            <a:schemeClr val="lt1"/>
-          </a:fontRef>
-        </p:style>
-        <p:txBody>
-          <a:bodyPr rtlCol="0" anchor="ctr"/>
-          <a:lstStyle/>
-          <a:p>
-            <a:pPr algn="ctr"/>
-            <a:endParaRPr lang="en-US" dirty="0"/>
-          </a:p>
-        </p:txBody>
-      </p:sp>
-      <p:sp>
-        <p:nvSpPr>
-          <p:cNvPr id="11" name="Oval 10"/>
-          <p:cNvSpPr/>
-          <p:nvPr/>
-        </p:nvSpPr>
-        <p:spPr>
-          <a:xfrm>
-            <a:off x="6090356" y="3626556"/>
-            <a:ext cx="524933" cy="508000"/>
-          </a:xfrm>
-          <a:prstGeom prst="ellipse">
-            <a:avLst/>
-          </a:prstGeom>
-          <a:ln/>
-        </p:spPr>
-        <p:style>
-          <a:lnRef idx="2">
-            <a:schemeClr val="accent3">
-              <a:shade val="50000"/>
-            </a:schemeClr>
-          </a:lnRef>
-          <a:fillRef idx="1">
-            <a:schemeClr val="accent3"/>
-          </a:fillRef>
-          <a:effectRef idx="0">
-            <a:schemeClr val="accent3"/>
-          </a:effectRef>
-          <a:fontRef idx="minor">
-            <a:schemeClr val="lt1"/>
-          </a:fontRef>
-        </p:style>
-        <p:txBody>
-          <a:bodyPr rtlCol="0" anchor="ctr"/>
-          <a:lstStyle/>
-          <a:p>
-            <a:pPr algn="ctr"/>
-            <a:endParaRPr lang="en-US" dirty="0"/>
-          </a:p>
-        </p:txBody>
-      </p:sp>
-      <p:sp>
-        <p:nvSpPr>
-          <p:cNvPr id="12" name="Rectangle 11"/>
-          <p:cNvSpPr/>
-          <p:nvPr/>
-        </p:nvSpPr>
-        <p:spPr>
-          <a:xfrm>
-            <a:off x="2511778" y="3711223"/>
-            <a:ext cx="1103488" cy="366889"/>
-          </a:xfrm>
-          <a:prstGeom prst="rect">
-            <a:avLst/>
-          </a:prstGeom>
-          <a:solidFill>
-            <a:srgbClr val="FFFF00"/>
-          </a:solidFill>
-          <a:ln>
-            <a:solidFill>
-              <a:schemeClr val="bg1">
-                <a:lumMod val="50000"/>
-              </a:schemeClr>
-            </a:solidFill>
-          </a:ln>
-        </p:spPr>
-        <p:style>
-          <a:lnRef idx="2">
-            <a:schemeClr val="accent6">
-              <a:shade val="50000"/>
-            </a:schemeClr>
-          </a:lnRef>
-          <a:fillRef idx="1">
-            <a:schemeClr val="accent6"/>
-          </a:fillRef>
-          <a:effectRef idx="0">
-            <a:schemeClr val="accent6"/>
-          </a:effectRef>
-          <a:fontRef idx="minor">
-            <a:schemeClr val="lt1"/>
-          </a:fontRef>
-        </p:style>
-        <p:txBody>
-          <a:bodyPr rtlCol="0" anchor="ctr"/>
-          <a:lstStyle/>
-          <a:p>
-            <a:pPr algn="ctr"/>
-            <a:r>
-              <a:rPr lang="en-US" dirty="0" smtClean="0">
-                <a:solidFill>
-                  <a:srgbClr val="FF0000"/>
-                </a:solidFill>
-              </a:rPr>
-              <a:t>Queue</a:t>
-            </a:r>
-            <a:endParaRPr lang="en-US" dirty="0">
-              <a:solidFill>
-                <a:srgbClr val="FF0000"/>
-              </a:solidFill>
-            </a:endParaRPr>
-          </a:p>
-        </p:txBody>
-      </p:sp>
-      <p:sp>
-        <p:nvSpPr>
-          <p:cNvPr id="13" name="Rectangle 12"/>
-          <p:cNvSpPr/>
-          <p:nvPr/>
-        </p:nvSpPr>
-        <p:spPr>
-          <a:xfrm>
-            <a:off x="4986868" y="3711223"/>
-            <a:ext cx="1103488" cy="366889"/>
-          </a:xfrm>
-          <a:prstGeom prst="rect">
-            <a:avLst/>
-          </a:prstGeom>
-          <a:solidFill>
-            <a:srgbClr val="FFFF00"/>
-          </a:solidFill>
-          <a:ln>
-            <a:solidFill>
-              <a:schemeClr val="bg1">
-                <a:lumMod val="50000"/>
-              </a:schemeClr>
-            </a:solidFill>
-          </a:ln>
-        </p:spPr>
-        <p:style>
-          <a:lnRef idx="2">
-            <a:schemeClr val="accent6">
-              <a:shade val="50000"/>
-            </a:schemeClr>
-          </a:lnRef>
-          <a:fillRef idx="1">
-            <a:schemeClr val="accent6"/>
-          </a:fillRef>
-          <a:effectRef idx="0">
-            <a:schemeClr val="accent6"/>
-          </a:effectRef>
-          <a:fontRef idx="minor">
-            <a:schemeClr val="lt1"/>
-          </a:fontRef>
-        </p:style>
-        <p:txBody>
-          <a:bodyPr rtlCol="0" anchor="ctr"/>
-          <a:lstStyle/>
-          <a:p>
-            <a:pPr algn="ctr"/>
-            <a:r>
-              <a:rPr lang="en-US" dirty="0" smtClean="0">
-                <a:solidFill>
-                  <a:srgbClr val="FF0000"/>
-                </a:solidFill>
-              </a:rPr>
-              <a:t>Queue</a:t>
-            </a:r>
-            <a:endParaRPr lang="en-US" dirty="0">
-              <a:solidFill>
-                <a:srgbClr val="FF0000"/>
-              </a:solidFill>
-            </a:endParaRPr>
-          </a:p>
-        </p:txBody>
-      </p:sp>
-      <p:sp>
-        <p:nvSpPr>
           <p:cNvPr id="14" name="Left-Right Arrow 13"/>
           <p:cNvSpPr/>
           <p:nvPr/>
         </p:nvSpPr>
         <p:spPr>
           <a:xfrm>
-            <a:off x="4196643" y="3781779"/>
-            <a:ext cx="747892" cy="254000"/>
+            <a:off x="3993446" y="3753557"/>
+            <a:ext cx="1165574" cy="254000"/>
           </a:xfrm>
           <a:prstGeom prst="leftRightArrow">
             <a:avLst/>
@@ -4921,8 +4733,8 @@
         </p:nvSpPr>
         <p:spPr>
           <a:xfrm>
-            <a:off x="1749778" y="3725335"/>
-            <a:ext cx="747892" cy="324556"/>
+            <a:off x="1749777" y="3725335"/>
+            <a:ext cx="1044223" cy="310444"/>
           </a:xfrm>
           <a:prstGeom prst="leftRightArrow">
             <a:avLst/>
@@ -4973,8 +4785,8 @@
         </p:nvSpPr>
         <p:spPr>
           <a:xfrm>
-            <a:off x="6635041" y="3725335"/>
-            <a:ext cx="747892" cy="324556"/>
+            <a:off x="6293552" y="3725335"/>
+            <a:ext cx="1089381" cy="310444"/>
           </a:xfrm>
           <a:prstGeom prst="leftRightArrow">
             <a:avLst/>
@@ -5199,6 +5011,88 @@
           </a:p>
         </p:txBody>
       </p:sp>
+      <p:sp>
+        <p:nvSpPr>
+          <p:cNvPr id="20" name="Oval 19"/>
+          <p:cNvSpPr/>
+          <p:nvPr/>
+        </p:nvSpPr>
+        <p:spPr>
+          <a:xfrm>
+            <a:off x="2836334" y="3626556"/>
+            <a:ext cx="1078088" cy="508000"/>
+          </a:xfrm>
+          <a:prstGeom prst="ellipse">
+            <a:avLst/>
+          </a:prstGeom>
+          <a:ln/>
+        </p:spPr>
+        <p:style>
+          <a:lnRef idx="2">
+            <a:schemeClr val="accent3">
+              <a:shade val="50000"/>
+            </a:schemeClr>
+          </a:lnRef>
+          <a:fillRef idx="1">
+            <a:schemeClr val="accent3"/>
+          </a:fillRef>
+          <a:effectRef idx="0">
+            <a:schemeClr val="accent3"/>
+          </a:effectRef>
+          <a:fontRef idx="minor">
+            <a:schemeClr val="lt1"/>
+          </a:fontRef>
+        </p:style>
+        <p:txBody>
+          <a:bodyPr rtlCol="0" anchor="ctr"/>
+          <a:lstStyle/>
+          <a:p>
+            <a:pPr algn="ctr"/>
+            <a:endParaRPr lang="en-US" dirty="0"/>
+          </a:p>
+        </p:txBody>
+      </p:sp>
+      <p:sp>
+        <p:nvSpPr>
+          <p:cNvPr id="25" name="Oval 24"/>
+          <p:cNvSpPr/>
+          <p:nvPr/>
+        </p:nvSpPr>
+        <p:spPr>
+          <a:xfrm>
+            <a:off x="5215464" y="3626557"/>
+            <a:ext cx="1078088" cy="508000"/>
+          </a:xfrm>
+          <a:prstGeom prst="ellipse">
+            <a:avLst/>
+          </a:prstGeom>
+          <a:ln/>
+        </p:spPr>
+        <p:style>
+          <a:lnRef idx="2">
+            <a:schemeClr val="accent3">
+              <a:shade val="50000"/>
+            </a:schemeClr>
+          </a:lnRef>
+          <a:fillRef idx="1">
+            <a:schemeClr val="accent3"/>
+          </a:fillRef>
+          <a:effectRef idx="0">
+            <a:schemeClr val="accent3"/>
+          </a:effectRef>
+          <a:fontRef idx="minor">
+            <a:schemeClr val="lt1"/>
+          </a:fontRef>
+        </p:style>
+        <p:txBody>
+          <a:bodyPr rtlCol="0" anchor="ctr"/>
+          <a:lstStyle/>
+          <a:p>
+            <a:pPr algn="ctr"/>
+            <a:endParaRPr lang="en-US" dirty="0"/>
+          </a:p>
+        </p:txBody>
+      </p:sp>
     </p:spTree>
     <p:extLst>
       <p:ext uri="{BB962C8B-B14F-4D97-AF65-F5344CB8AC3E}">
@@ -5209,6 +5103,13 @@
   <p:clrMapOvr>
     <a:masterClrMapping/>
   </p:clrMapOvr>
+  <p:timing>
+    <p:tnLst>
+      <p:par>
+        <p:cTn xmlns:p14="http://schemas.microsoft.com/office/powerpoint/2010/main" id="1" dur="indefinite" restart="never" nodeType="tmRoot"/>
+      </p:par>
+    </p:tnLst>
+  </p:timing>
 </p:sld>
 </file>
 
@@ -5378,220 +5279,14 @@
       </p:sp>
       <p:sp>
         <p:nvSpPr>
-          <p:cNvPr id="6" name="Oval 5"/>
-          <p:cNvSpPr/>
-          <p:nvPr/>
-        </p:nvSpPr>
-        <p:spPr>
-          <a:xfrm>
-            <a:off x="3629377" y="3626556"/>
-            <a:ext cx="524933" cy="508000"/>
-          </a:xfrm>
-          <a:prstGeom prst="ellipse">
-            <a:avLst/>
-          </a:prstGeom>
-          <a:ln/>
-        </p:spPr>
-        <p:style>
-          <a:lnRef idx="2">
-            <a:schemeClr val="accent3">
-              <a:shade val="50000"/>
-            </a:schemeClr>
-          </a:lnRef>
-          <a:fillRef idx="1">
-            <a:schemeClr val="accent3"/>
-          </a:fillRef>
-          <a:effectRef idx="0">
-            <a:schemeClr val="accent3"/>
-          </a:effectRef>
-          <a:fontRef idx="minor">
-            <a:schemeClr val="lt1"/>
-          </a:fontRef>
-        </p:style>
-        <p:txBody>
-          <a:bodyPr rtlCol="0" anchor="ctr"/>
-          <a:lstStyle/>
-          <a:p>
-            <a:pPr algn="ctr"/>
-            <a:endParaRPr lang="en-US" dirty="0"/>
-          </a:p>
-        </p:txBody>
-      </p:sp>
-      <p:sp>
-        <p:nvSpPr>
-          <p:cNvPr id="7" name="Oval 6"/>
-          <p:cNvSpPr/>
-          <p:nvPr/>
-        </p:nvSpPr>
-        <p:spPr>
-          <a:xfrm>
-            <a:off x="6090356" y="3626556"/>
-            <a:ext cx="524933" cy="508000"/>
-          </a:xfrm>
-          <a:prstGeom prst="ellipse">
-            <a:avLst/>
-          </a:prstGeom>
-          <a:ln/>
-        </p:spPr>
-        <p:style>
-          <a:lnRef idx="2">
-            <a:schemeClr val="accent3">
-              <a:shade val="50000"/>
-            </a:schemeClr>
-          </a:lnRef>
-          <a:fillRef idx="1">
-            <a:schemeClr val="accent3"/>
-          </a:fillRef>
-          <a:effectRef idx="0">
-            <a:schemeClr val="accent3"/>
-          </a:effectRef>
-          <a:fontRef idx="minor">
-            <a:schemeClr val="lt1"/>
-          </a:fontRef>
-        </p:style>
-        <p:txBody>
-          <a:bodyPr rtlCol="0" anchor="ctr"/>
-          <a:lstStyle/>
-          <a:p>
-            <a:pPr algn="ctr"/>
-            <a:endParaRPr lang="en-US" dirty="0"/>
-          </a:p>
-        </p:txBody>
-      </p:sp>
-      <p:sp>
-        <p:nvSpPr>
-          <p:cNvPr id="8" name="Rectangle 7"/>
-          <p:cNvSpPr/>
-          <p:nvPr/>
-        </p:nvSpPr>
-        <p:spPr>
-          <a:xfrm>
-            <a:off x="2511778" y="3711223"/>
-            <a:ext cx="1103488" cy="366889"/>
-          </a:xfrm>
-          <a:prstGeom prst="rect">
-            <a:avLst/>
-          </a:prstGeom>
-          <a:solidFill>
-            <a:srgbClr val="FFFF00"/>
-          </a:solidFill>
-          <a:ln>
-            <a:solidFill>
-              <a:schemeClr val="bg1">
-                <a:lumMod val="50000"/>
-              </a:schemeClr>
-            </a:solidFill>
-          </a:ln>
-        </p:spPr>
-        <p:style>
-          <a:lnRef idx="2">
-            <a:schemeClr val="accent6">
-              <a:shade val="50000"/>
-            </a:schemeClr>
-          </a:lnRef>
-          <a:fillRef idx="1">
-            <a:schemeClr val="accent6"/>
-          </a:fillRef>
-          <a:effectRef idx="0">
-            <a:schemeClr val="accent6"/>
-          </a:effectRef>
-          <a:fontRef idx="minor">
-            <a:schemeClr val="lt1"/>
-          </a:fontRef>
-        </p:style>
-        <p:txBody>
-          <a:bodyPr rtlCol="0" anchor="ctr"/>
-          <a:lstStyle/>
-          <a:p>
-            <a:pPr algn="ctr"/>
-            <a:r>
-              <a:rPr lang="en-US" dirty="0" smtClean="0">
-                <a:solidFill>
-                  <a:srgbClr val="FF0000"/>
-                </a:solidFill>
-              </a:rPr>
-              <a:t>Queue</a:t>
-            </a:r>
-            <a:endParaRPr lang="en-US" dirty="0">
-              <a:solidFill>
-                <a:srgbClr val="FF0000"/>
-              </a:solidFill>
-            </a:endParaRPr>
-          </a:p>
-        </p:txBody>
-      </p:sp>
-      <p:sp>
-        <p:nvSpPr>
-          <p:cNvPr id="9" name="Rectangle 8"/>
-          <p:cNvSpPr/>
-          <p:nvPr/>
-        </p:nvSpPr>
-        <p:spPr>
-          <a:xfrm>
-            <a:off x="4986868" y="3711223"/>
-            <a:ext cx="1103488" cy="366889"/>
-          </a:xfrm>
-          <a:prstGeom prst="rect">
-            <a:avLst/>
-          </a:prstGeom>
-          <a:solidFill>
-            <a:srgbClr val="FFFF00"/>
-          </a:solidFill>
-          <a:ln>
-            <a:solidFill>
-              <a:schemeClr val="bg1">
-                <a:lumMod val="50000"/>
-              </a:schemeClr>
-            </a:solidFill>
-          </a:ln>
-        </p:spPr>
-        <p:style>
-          <a:lnRef idx="2">
-            <a:schemeClr val="accent6">
-              <a:shade val="50000"/>
-            </a:schemeClr>
-          </a:lnRef>
-          <a:fillRef idx="1">
-            <a:schemeClr val="accent6"/>
-          </a:fillRef>
-          <a:effectRef idx="0">
-            <a:schemeClr val="accent6"/>
-          </a:effectRef>
-          <a:fontRef idx="minor">
-            <a:schemeClr val="lt1"/>
-          </a:fontRef>
-        </p:style>
-        <p:txBody>
-          <a:bodyPr rtlCol="0" anchor="ctr"/>
-          <a:lstStyle/>
-          <a:p>
-            <a:pPr algn="ctr"/>
-            <a:r>
-              <a:rPr lang="en-US" dirty="0" smtClean="0">
-                <a:solidFill>
-                  <a:srgbClr val="FF0000"/>
-                </a:solidFill>
-              </a:rPr>
-              <a:t>Queue</a:t>
-            </a:r>
-            <a:endParaRPr lang="en-US" dirty="0">
-              <a:solidFill>
-                <a:srgbClr val="FF0000"/>
-              </a:solidFill>
-            </a:endParaRPr>
-          </a:p>
-        </p:txBody>
-      </p:sp>
-      <p:sp>
-        <p:nvSpPr>
           <p:cNvPr id="10" name="Left-Right Arrow 9"/>
           <p:cNvSpPr/>
           <p:nvPr/>
         </p:nvSpPr>
         <p:spPr>
           <a:xfrm>
-            <a:off x="4196643" y="3739446"/>
-            <a:ext cx="747892" cy="310444"/>
+            <a:off x="1763886" y="3725336"/>
+            <a:ext cx="1072448" cy="310444"/>
           </a:xfrm>
           <a:prstGeom prst="leftRightArrow">
             <a:avLst/>
@@ -5634,102 +5329,6 @@
           </a:p>
         </p:txBody>
       </p:sp>
-      <p:sp>
-        <p:nvSpPr>
-          <p:cNvPr id="11" name="Left-Right Arrow 10"/>
-          <p:cNvSpPr/>
-          <p:nvPr/>
-        </p:nvSpPr>
-        <p:spPr>
-          <a:xfrm>
-            <a:off x="1749778" y="3809999"/>
-            <a:ext cx="747892" cy="183447"/>
-          </a:xfrm>
-          <a:prstGeom prst="leftRightArrow">
-            <a:avLst/>
-          </a:prstGeom>
-          <a:solidFill>
-            <a:srgbClr val="000000"/>
-          </a:solidFill>
-          <a:ln>
-            <a:solidFill>
-              <a:srgbClr val="000000"/>
-            </a:solidFill>
-          </a:ln>
-        </p:spPr>
-        <p:style>
-          <a:lnRef idx="2">
-            <a:schemeClr val="accent1">
-              <a:shade val="50000"/>
-            </a:schemeClr>
-          </a:lnRef>
-          <a:fillRef idx="1">
-            <a:schemeClr val="accent1"/>
-          </a:fillRef>
-          <a:effectRef idx="0">
-            <a:schemeClr val="accent1"/>
-          </a:effectRef>
-          <a:fontRef idx="minor">
-            <a:schemeClr val="lt1"/>
-          </a:fontRef>
-        </p:style>
-        <p:txBody>
-          <a:bodyPr rtlCol="0" anchor="ctr"/>
-          <a:lstStyle/>
-          <a:p>
-            <a:pPr algn="ctr"/>
-            <a:endParaRPr lang="en-US"/>
-          </a:p>
-        </p:txBody>
-      </p:sp>
-      <p:sp>
-        <p:nvSpPr>
-          <p:cNvPr id="12" name="Left-Right Arrow 11"/>
-          <p:cNvSpPr/>
-          <p:nvPr/>
-        </p:nvSpPr>
-        <p:spPr>
-          <a:xfrm>
-            <a:off x="6649152" y="3781777"/>
-            <a:ext cx="747892" cy="239892"/>
-          </a:xfrm>
-          <a:prstGeom prst="leftRightArrow">
-            <a:avLst/>
-          </a:prstGeom>
-          <a:solidFill>
-            <a:schemeClr val="tx1"/>
-          </a:solidFill>
-          <a:ln>
-            <a:solidFill>
-              <a:schemeClr val="tx1"/>
-            </a:solidFill>
-          </a:ln>
-        </p:spPr>
-        <p:style>
-          <a:lnRef idx="2">
-            <a:schemeClr val="accent1">
-              <a:shade val="50000"/>
-            </a:schemeClr>
-          </a:lnRef>
-          <a:fillRef idx="1">
-            <a:schemeClr val="accent1"/>
-          </a:fillRef>
-          <a:effectRef idx="0">
-            <a:schemeClr val="accent1"/>
-          </a:effectRef>
-          <a:fontRef idx="minor">
-            <a:schemeClr val="lt1"/>
-          </a:fontRef>
-        </p:style>
-        <p:txBody>
-          <a:bodyPr rtlCol="0" anchor="ctr"/>
-          <a:lstStyle/>
-          <a:p>
-            <a:pPr algn="ctr"/>
-            <a:endParaRPr lang="en-US"/>
-          </a:p>
-        </p:txBody>
-      </p:sp>
       <p:grpSp>
         <p:nvGrpSpPr>
           <p:cNvPr id="26" name="Group 25"/>
@@ -5738,7 +5337,7 @@
         </p:nvGrpSpPr>
         <p:grpSpPr>
           <a:xfrm>
-            <a:off x="1735668" y="3175000"/>
+            <a:off x="4196643" y="3017335"/>
             <a:ext cx="793045" cy="693888"/>
             <a:chOff x="1735668" y="3175000"/>
             <a:chExt cx="793045" cy="693888"/>
@@ -5966,726 +5565,16 @@
           </p:txBody>
         </p:sp>
       </p:grpSp>
-      <p:grpSp>
-        <p:nvGrpSpPr>
-          <p:cNvPr id="27" name="Group 26"/>
-          <p:cNvGrpSpPr/>
-          <p:nvPr/>
-        </p:nvGrpSpPr>
-        <p:grpSpPr>
-          <a:xfrm>
-            <a:off x="6615290" y="3175000"/>
-            <a:ext cx="793045" cy="692668"/>
-            <a:chOff x="6615290" y="3175000"/>
-            <a:chExt cx="793045" cy="692668"/>
-          </a:xfrm>
-        </p:grpSpPr>
-        <p:cxnSp>
-          <p:nvCxnSpPr>
-            <p:cNvPr id="21" name="Straight Arrow Connector 20"/>
-            <p:cNvCxnSpPr/>
-            <p:nvPr/>
-          </p:nvCxnSpPr>
-          <p:spPr>
-            <a:xfrm flipH="1" flipV="1">
-              <a:off x="6629400" y="3175000"/>
-              <a:ext cx="14112" cy="437445"/>
-            </a:xfrm>
-            <a:prstGeom prst="straightConnector1">
-              <a:avLst/>
-            </a:prstGeom>
-            <a:ln>
-              <a:solidFill>
-                <a:srgbClr val="000000"/>
-              </a:solidFill>
-              <a:tailEnd type="arrow"/>
-            </a:ln>
-          </p:spPr>
-          <p:style>
-            <a:lnRef idx="1">
-              <a:schemeClr val="dk1"/>
-            </a:lnRef>
-            <a:fillRef idx="0">
-              <a:schemeClr val="dk1"/>
-            </a:fillRef>
-            <a:effectRef idx="0">
-              <a:schemeClr val="dk1"/>
-            </a:effectRef>
-            <a:fontRef idx="minor">
-              <a:schemeClr val="tx1"/>
-            </a:fontRef>
-          </p:style>
-        </p:cxnSp>
-        <p:cxnSp>
-          <p:nvCxnSpPr>
-            <p:cNvPr id="22" name="Straight Arrow Connector 21"/>
-            <p:cNvCxnSpPr/>
-            <p:nvPr/>
-          </p:nvCxnSpPr>
-          <p:spPr>
-            <a:xfrm>
-              <a:off x="6615290" y="3584223"/>
-              <a:ext cx="793045" cy="0"/>
-            </a:xfrm>
-            <a:prstGeom prst="straightConnector1">
-              <a:avLst/>
-            </a:prstGeom>
-            <a:ln>
-              <a:solidFill>
-                <a:srgbClr val="000000"/>
-              </a:solidFill>
-              <a:tailEnd type="arrow"/>
-            </a:ln>
-          </p:spPr>
-          <p:style>
-            <a:lnRef idx="1">
-              <a:schemeClr val="dk1"/>
-            </a:lnRef>
-            <a:fillRef idx="0">
-              <a:schemeClr val="dk1"/>
-            </a:fillRef>
-            <a:effectRef idx="0">
-              <a:schemeClr val="dk1"/>
-            </a:effectRef>
-            <a:fontRef idx="minor">
-              <a:schemeClr val="tx1"/>
-            </a:fontRef>
-          </p:style>
-        </p:cxnSp>
-        <p:sp>
-          <p:nvSpPr>
-            <p:cNvPr id="23" name="Freeform 22"/>
-            <p:cNvSpPr/>
-            <p:nvPr/>
-          </p:nvSpPr>
-          <p:spPr>
-            <a:xfrm>
-              <a:off x="6728178" y="3188166"/>
-              <a:ext cx="606777" cy="269057"/>
-            </a:xfrm>
-            <a:custGeom>
-              <a:avLst/>
-              <a:gdLst>
-                <a:gd name="connsiteX0" fmla="*/ 0 w 606777"/>
-                <a:gd name="connsiteY0" fmla="*/ 130002 h 261227"/>
-                <a:gd name="connsiteX1" fmla="*/ 141111 w 606777"/>
-                <a:gd name="connsiteY1" fmla="*/ 3002 h 261227"/>
-                <a:gd name="connsiteX2" fmla="*/ 211666 w 606777"/>
-                <a:gd name="connsiteY2" fmla="*/ 242891 h 261227"/>
-                <a:gd name="connsiteX3" fmla="*/ 366888 w 606777"/>
-                <a:gd name="connsiteY3" fmla="*/ 228780 h 261227"/>
-                <a:gd name="connsiteX4" fmla="*/ 508000 w 606777"/>
-                <a:gd name="connsiteY4" fmla="*/ 101780 h 261227"/>
-                <a:gd name="connsiteX5" fmla="*/ 606777 w 606777"/>
-                <a:gd name="connsiteY5" fmla="*/ 101780 h 261227"/>
-                <a:gd name="connsiteX6" fmla="*/ 606777 w 606777"/>
-                <a:gd name="connsiteY6" fmla="*/ 101780 h 261227"/>
-                <a:gd name="connsiteX0" fmla="*/ 0 w 606777"/>
-                <a:gd name="connsiteY0" fmla="*/ 128329 h 227252"/>
-                <a:gd name="connsiteX1" fmla="*/ 141111 w 606777"/>
-                <a:gd name="connsiteY1" fmla="*/ 1329 h 227252"/>
-                <a:gd name="connsiteX2" fmla="*/ 310444 w 606777"/>
-                <a:gd name="connsiteY2" fmla="*/ 71885 h 227252"/>
-                <a:gd name="connsiteX3" fmla="*/ 366888 w 606777"/>
-                <a:gd name="connsiteY3" fmla="*/ 227107 h 227252"/>
-                <a:gd name="connsiteX4" fmla="*/ 508000 w 606777"/>
-                <a:gd name="connsiteY4" fmla="*/ 100107 h 227252"/>
-                <a:gd name="connsiteX5" fmla="*/ 606777 w 606777"/>
-                <a:gd name="connsiteY5" fmla="*/ 100107 h 227252"/>
-                <a:gd name="connsiteX6" fmla="*/ 606777 w 606777"/>
-                <a:gd name="connsiteY6" fmla="*/ 100107 h 227252"/>
-                <a:gd name="connsiteX0" fmla="*/ 0 w 606777"/>
-                <a:gd name="connsiteY0" fmla="*/ 128329 h 276434"/>
-                <a:gd name="connsiteX1" fmla="*/ 141111 w 606777"/>
-                <a:gd name="connsiteY1" fmla="*/ 1329 h 276434"/>
-                <a:gd name="connsiteX2" fmla="*/ 310444 w 606777"/>
-                <a:gd name="connsiteY2" fmla="*/ 71885 h 276434"/>
-                <a:gd name="connsiteX3" fmla="*/ 366888 w 606777"/>
-                <a:gd name="connsiteY3" fmla="*/ 227107 h 276434"/>
-                <a:gd name="connsiteX4" fmla="*/ 508000 w 606777"/>
-                <a:gd name="connsiteY4" fmla="*/ 269440 h 276434"/>
-                <a:gd name="connsiteX5" fmla="*/ 606777 w 606777"/>
-                <a:gd name="connsiteY5" fmla="*/ 100107 h 276434"/>
-                <a:gd name="connsiteX6" fmla="*/ 606777 w 606777"/>
-                <a:gd name="connsiteY6" fmla="*/ 100107 h 276434"/>
-                <a:gd name="connsiteX0" fmla="*/ 0 w 606777"/>
-                <a:gd name="connsiteY0" fmla="*/ 127946 h 269057"/>
-                <a:gd name="connsiteX1" fmla="*/ 141111 w 606777"/>
-                <a:gd name="connsiteY1" fmla="*/ 946 h 269057"/>
-                <a:gd name="connsiteX2" fmla="*/ 310444 w 606777"/>
-                <a:gd name="connsiteY2" fmla="*/ 71502 h 269057"/>
-                <a:gd name="connsiteX3" fmla="*/ 479777 w 606777"/>
-                <a:gd name="connsiteY3" fmla="*/ 99724 h 269057"/>
-                <a:gd name="connsiteX4" fmla="*/ 508000 w 606777"/>
-                <a:gd name="connsiteY4" fmla="*/ 269057 h 269057"/>
-                <a:gd name="connsiteX5" fmla="*/ 606777 w 606777"/>
-                <a:gd name="connsiteY5" fmla="*/ 99724 h 269057"/>
-                <a:gd name="connsiteX6" fmla="*/ 606777 w 606777"/>
-                <a:gd name="connsiteY6" fmla="*/ 99724 h 269057"/>
-              </a:gdLst>
-              <a:ahLst/>
-              <a:cxnLst>
-                <a:cxn ang="0">
-                  <a:pos x="connsiteX0" y="connsiteY0"/>
-                </a:cxn>
-                <a:cxn ang="0">
-                  <a:pos x="connsiteX1" y="connsiteY1"/>
-                </a:cxn>
-                <a:cxn ang="0">
-                  <a:pos x="connsiteX2" y="connsiteY2"/>
-                </a:cxn>
-                <a:cxn ang="0">
-                  <a:pos x="connsiteX3" y="connsiteY3"/>
-                </a:cxn>
-                <a:cxn ang="0">
-                  <a:pos x="connsiteX4" y="connsiteY4"/>
-                </a:cxn>
-                <a:cxn ang="0">
-                  <a:pos x="connsiteX5" y="connsiteY5"/>
-                </a:cxn>
-                <a:cxn ang="0">
-                  <a:pos x="connsiteX6" y="connsiteY6"/>
-                </a:cxn>
-              </a:cxnLst>
-              <a:rect l="l" t="t" r="r" b="b"/>
-              <a:pathLst>
-                <a:path w="606777" h="269057">
-                  <a:moveTo>
-                    <a:pt x="0" y="127946"/>
-                  </a:moveTo>
-                  <a:cubicBezTo>
-                    <a:pt x="52916" y="55038"/>
-                    <a:pt x="89370" y="10353"/>
-                    <a:pt x="141111" y="946"/>
-                  </a:cubicBezTo>
-                  <a:cubicBezTo>
-                    <a:pt x="192852" y="-8461"/>
-                    <a:pt x="254000" y="55039"/>
-                    <a:pt x="310444" y="71502"/>
-                  </a:cubicBezTo>
-                  <a:cubicBezTo>
-                    <a:pt x="366888" y="87965"/>
-                    <a:pt x="446851" y="66798"/>
-                    <a:pt x="479777" y="99724"/>
-                  </a:cubicBezTo>
-                  <a:cubicBezTo>
-                    <a:pt x="512703" y="132650"/>
-                    <a:pt x="486833" y="269057"/>
-                    <a:pt x="508000" y="269057"/>
-                  </a:cubicBezTo>
-                  <a:cubicBezTo>
-                    <a:pt x="529167" y="269057"/>
-                    <a:pt x="590314" y="127946"/>
-                    <a:pt x="606777" y="99724"/>
-                  </a:cubicBezTo>
-                  <a:lnTo>
-                    <a:pt x="606777" y="99724"/>
-                  </a:lnTo>
-                </a:path>
-              </a:pathLst>
-            </a:custGeom>
-            <a:ln w="38100" cmpd="sng">
-              <a:solidFill>
-                <a:schemeClr val="tx2"/>
-              </a:solidFill>
-            </a:ln>
-          </p:spPr>
-          <p:style>
-            <a:lnRef idx="1">
-              <a:schemeClr val="dk1"/>
-            </a:lnRef>
-            <a:fillRef idx="0">
-              <a:schemeClr val="dk1"/>
-            </a:fillRef>
-            <a:effectRef idx="0">
-              <a:schemeClr val="dk1"/>
-            </a:effectRef>
-            <a:fontRef idx="minor">
-              <a:schemeClr val="tx1"/>
-            </a:fontRef>
-          </p:style>
-          <p:txBody>
-            <a:bodyPr rtlCol="0" anchor="ctr"/>
-            <a:lstStyle/>
-            <a:p>
-              <a:pPr algn="ctr"/>
-              <a:endParaRPr lang="en-US"/>
-            </a:p>
-          </p:txBody>
-        </p:sp>
-        <p:sp>
-          <p:nvSpPr>
-            <p:cNvPr id="25" name="TextBox 24"/>
-            <p:cNvSpPr txBox="1"/>
-            <p:nvPr/>
-          </p:nvSpPr>
-          <p:spPr>
-            <a:xfrm>
-              <a:off x="6728178" y="3498336"/>
-              <a:ext cx="518091" cy="369332"/>
-            </a:xfrm>
-            <a:prstGeom prst="rect">
-              <a:avLst/>
-            </a:prstGeom>
-            <a:noFill/>
-          </p:spPr>
-          <p:txBody>
-            <a:bodyPr wrap="none" rtlCol="0">
-              <a:spAutoFit/>
-            </a:bodyPr>
-            <a:lstStyle/>
-            <a:p>
-              <a:r>
-                <a:rPr lang="en-US" dirty="0" smtClean="0"/>
-                <a:t>BW</a:t>
-              </a:r>
-              <a:endParaRPr lang="en-US" dirty="0"/>
-            </a:p>
-          </p:txBody>
-        </p:sp>
-      </p:grpSp>
-    </p:spTree>
-    <p:extLst>
-      <p:ext uri="{BB962C8B-B14F-4D97-AF65-F5344CB8AC3E}">
-        <p14:creationId xmlns:p14="http://schemas.microsoft.com/office/powerpoint/2010/main" val="394938149"/>
-      </p:ext>
-    </p:extLst>
-  </p:cSld>
-  <p:clrMapOvr>
-    <a:masterClrMapping/>
-  </p:clrMapOvr>
-</p:sld>
-</file>
-
-<file path=ppt/slides/slide7.xml><?xml version="1.0" encoding="utf-8"?>
-<p:sld xmlns:a="http://schemas.openxmlformats.org/drawingml/2006/main" xmlns:r="http://schemas.openxmlformats.org/officeDocument/2006/relationships" xmlns:p="http://schemas.openxmlformats.org/presentationml/2006/main">
-  <p:cSld>
-    <p:spTree>
-      <p:nvGrpSpPr>
-        <p:cNvPr id="1" name=""/>
-        <p:cNvGrpSpPr/>
-        <p:nvPr/>
-      </p:nvGrpSpPr>
-      <p:grpSpPr>
-        <a:xfrm>
-          <a:off x="0" y="0"/>
-          <a:ext cx="0" cy="0"/>
-          <a:chOff x="0" y="0"/>
-          <a:chExt cx="0" cy="0"/>
-        </a:xfrm>
-      </p:grpSpPr>
-      <p:sp>
-        <p:nvSpPr>
-          <p:cNvPr id="2" name="Title 1"/>
-          <p:cNvSpPr>
-            <a:spLocks noGrp="1"/>
-          </p:cNvSpPr>
-          <p:nvPr>
-            <p:ph type="title"/>
-          </p:nvPr>
-        </p:nvSpPr>
-        <p:spPr/>
-        <p:txBody>
-          <a:bodyPr/>
-          <a:lstStyle/>
-          <a:p>
-            <a:r>
-              <a:rPr lang="en-US" dirty="0"/>
-              <a:t>Evaluation Scenarios </a:t>
-            </a:r>
-            <a:r>
-              <a:rPr lang="en-US" dirty="0" smtClean="0"/>
-              <a:t>(3/</a:t>
-            </a:r>
-            <a:r>
-              <a:rPr lang="en-US" dirty="0"/>
-              <a:t>4)</a:t>
-            </a:r>
-          </a:p>
-        </p:txBody>
-      </p:sp>
-      <p:sp>
-        <p:nvSpPr>
-          <p:cNvPr id="3" name="Content Placeholder 2"/>
-          <p:cNvSpPr>
-            <a:spLocks noGrp="1"/>
-          </p:cNvSpPr>
-          <p:nvPr>
-            <p:ph idx="1"/>
-          </p:nvPr>
-        </p:nvSpPr>
-        <p:spPr/>
-        <p:txBody>
-          <a:bodyPr/>
-          <a:lstStyle/>
-          <a:p>
-            <a:r>
-              <a:rPr lang="en-US" dirty="0"/>
-              <a:t>Self-fairness</a:t>
-            </a:r>
-          </a:p>
-          <a:p>
-            <a:pPr marL="0" indent="0">
-              <a:buNone/>
-            </a:pPr>
-            <a:endParaRPr lang="en-US" dirty="0"/>
-          </a:p>
-        </p:txBody>
-      </p:sp>
-      <p:sp>
-        <p:nvSpPr>
-          <p:cNvPr id="4" name="Oval 3"/>
+      <p:sp>
+        <p:nvSpPr>
+          <p:cNvPr id="28" name="Left-Right Arrow 27"/>
           <p:cNvSpPr/>
           <p:nvPr/>
         </p:nvSpPr>
         <p:spPr>
           <a:xfrm>
-            <a:off x="945445" y="2892779"/>
-            <a:ext cx="776111" cy="733777"/>
-          </a:xfrm>
-          <a:prstGeom prst="ellipse">
-            <a:avLst/>
-          </a:prstGeom>
-          <a:ln/>
-        </p:spPr>
-        <p:style>
-          <a:lnRef idx="2">
-            <a:schemeClr val="accent2">
-              <a:shade val="50000"/>
-            </a:schemeClr>
-          </a:lnRef>
-          <a:fillRef idx="1">
-            <a:schemeClr val="accent2"/>
-          </a:fillRef>
-          <a:effectRef idx="0">
-            <a:schemeClr val="accent2"/>
-          </a:effectRef>
-          <a:fontRef idx="minor">
-            <a:schemeClr val="lt1"/>
-          </a:fontRef>
-        </p:style>
-        <p:txBody>
-          <a:bodyPr rtlCol="0" anchor="ctr"/>
-          <a:lstStyle/>
-          <a:p>
-            <a:pPr algn="ctr"/>
-            <a:r>
-              <a:rPr lang="en-US" dirty="0" smtClean="0"/>
-              <a:t>RTP</a:t>
-            </a:r>
-            <a:endParaRPr lang="en-US" dirty="0"/>
-          </a:p>
-        </p:txBody>
-      </p:sp>
-      <p:sp>
-        <p:nvSpPr>
-          <p:cNvPr id="5" name="Oval 4"/>
-          <p:cNvSpPr/>
-          <p:nvPr/>
-        </p:nvSpPr>
-        <p:spPr>
-          <a:xfrm>
-            <a:off x="7335082" y="2963337"/>
-            <a:ext cx="776111" cy="733777"/>
-          </a:xfrm>
-          <a:prstGeom prst="ellipse">
-            <a:avLst/>
-          </a:prstGeom>
-          <a:ln/>
-        </p:spPr>
-        <p:style>
-          <a:lnRef idx="2">
-            <a:schemeClr val="accent2">
-              <a:shade val="50000"/>
-            </a:schemeClr>
-          </a:lnRef>
-          <a:fillRef idx="1">
-            <a:schemeClr val="accent2"/>
-          </a:fillRef>
-          <a:effectRef idx="0">
-            <a:schemeClr val="accent2"/>
-          </a:effectRef>
-          <a:fontRef idx="minor">
-            <a:schemeClr val="lt1"/>
-          </a:fontRef>
-        </p:style>
-        <p:txBody>
-          <a:bodyPr rtlCol="0" anchor="ctr"/>
-          <a:lstStyle/>
-          <a:p>
-            <a:pPr algn="ctr"/>
-            <a:r>
-              <a:rPr lang="en-US" dirty="0" smtClean="0"/>
-              <a:t>RTP</a:t>
-            </a:r>
-            <a:endParaRPr lang="en-US" dirty="0"/>
-          </a:p>
-        </p:txBody>
-      </p:sp>
-      <p:sp>
-        <p:nvSpPr>
-          <p:cNvPr id="6" name="Oval 5"/>
-          <p:cNvSpPr/>
-          <p:nvPr/>
-        </p:nvSpPr>
-        <p:spPr>
-          <a:xfrm>
-            <a:off x="3629377" y="3626556"/>
-            <a:ext cx="524933" cy="508000"/>
-          </a:xfrm>
-          <a:prstGeom prst="ellipse">
-            <a:avLst/>
-          </a:prstGeom>
-          <a:ln/>
-        </p:spPr>
-        <p:style>
-          <a:lnRef idx="2">
-            <a:schemeClr val="accent3">
-              <a:shade val="50000"/>
-            </a:schemeClr>
-          </a:lnRef>
-          <a:fillRef idx="1">
-            <a:schemeClr val="accent3"/>
-          </a:fillRef>
-          <a:effectRef idx="0">
-            <a:schemeClr val="accent3"/>
-          </a:effectRef>
-          <a:fontRef idx="minor">
-            <a:schemeClr val="lt1"/>
-          </a:fontRef>
-        </p:style>
-        <p:txBody>
-          <a:bodyPr rtlCol="0" anchor="ctr"/>
-          <a:lstStyle/>
-          <a:p>
-            <a:pPr algn="ctr"/>
-            <a:endParaRPr lang="en-US" dirty="0"/>
-          </a:p>
-        </p:txBody>
-      </p:sp>
-      <p:sp>
-        <p:nvSpPr>
-          <p:cNvPr id="7" name="Oval 6"/>
-          <p:cNvSpPr/>
-          <p:nvPr/>
-        </p:nvSpPr>
-        <p:spPr>
-          <a:xfrm>
-            <a:off x="6090356" y="3626556"/>
-            <a:ext cx="524933" cy="508000"/>
-          </a:xfrm>
-          <a:prstGeom prst="ellipse">
-            <a:avLst/>
-          </a:prstGeom>
-          <a:ln/>
-        </p:spPr>
-        <p:style>
-          <a:lnRef idx="2">
-            <a:schemeClr val="accent3">
-              <a:shade val="50000"/>
-            </a:schemeClr>
-          </a:lnRef>
-          <a:fillRef idx="1">
-            <a:schemeClr val="accent3"/>
-          </a:fillRef>
-          <a:effectRef idx="0">
-            <a:schemeClr val="accent3"/>
-          </a:effectRef>
-          <a:fontRef idx="minor">
-            <a:schemeClr val="lt1"/>
-          </a:fontRef>
-        </p:style>
-        <p:txBody>
-          <a:bodyPr rtlCol="0" anchor="ctr"/>
-          <a:lstStyle/>
-          <a:p>
-            <a:pPr algn="ctr"/>
-            <a:endParaRPr lang="en-US" dirty="0"/>
-          </a:p>
-        </p:txBody>
-      </p:sp>
-      <p:sp>
-        <p:nvSpPr>
-          <p:cNvPr id="8" name="Rectangle 7"/>
-          <p:cNvSpPr/>
-          <p:nvPr/>
-        </p:nvSpPr>
-        <p:spPr>
-          <a:xfrm>
-            <a:off x="2511778" y="3711223"/>
-            <a:ext cx="1103488" cy="366889"/>
-          </a:xfrm>
-          <a:prstGeom prst="rect">
-            <a:avLst/>
-          </a:prstGeom>
-          <a:solidFill>
-            <a:srgbClr val="FFFF00"/>
-          </a:solidFill>
-          <a:ln>
-            <a:solidFill>
-              <a:schemeClr val="bg1">
-                <a:lumMod val="50000"/>
-              </a:schemeClr>
-            </a:solidFill>
-          </a:ln>
-        </p:spPr>
-        <p:style>
-          <a:lnRef idx="2">
-            <a:schemeClr val="accent6">
-              <a:shade val="50000"/>
-            </a:schemeClr>
-          </a:lnRef>
-          <a:fillRef idx="1">
-            <a:schemeClr val="accent6"/>
-          </a:fillRef>
-          <a:effectRef idx="0">
-            <a:schemeClr val="accent6"/>
-          </a:effectRef>
-          <a:fontRef idx="minor">
-            <a:schemeClr val="lt1"/>
-          </a:fontRef>
-        </p:style>
-        <p:txBody>
-          <a:bodyPr rtlCol="0" anchor="ctr"/>
-          <a:lstStyle/>
-          <a:p>
-            <a:pPr algn="ctr"/>
-            <a:r>
-              <a:rPr lang="en-US" dirty="0" smtClean="0">
-                <a:solidFill>
-                  <a:srgbClr val="FF0000"/>
-                </a:solidFill>
-              </a:rPr>
-              <a:t>Queue</a:t>
-            </a:r>
-            <a:endParaRPr lang="en-US" dirty="0">
-              <a:solidFill>
-                <a:srgbClr val="FF0000"/>
-              </a:solidFill>
-            </a:endParaRPr>
-          </a:p>
-        </p:txBody>
-      </p:sp>
-      <p:sp>
-        <p:nvSpPr>
-          <p:cNvPr id="9" name="Rectangle 8"/>
-          <p:cNvSpPr/>
-          <p:nvPr/>
-        </p:nvSpPr>
-        <p:spPr>
-          <a:xfrm>
-            <a:off x="4986868" y="3711223"/>
-            <a:ext cx="1103488" cy="366889"/>
-          </a:xfrm>
-          <a:prstGeom prst="rect">
-            <a:avLst/>
-          </a:prstGeom>
-          <a:solidFill>
-            <a:srgbClr val="FFFF00"/>
-          </a:solidFill>
-          <a:ln>
-            <a:solidFill>
-              <a:schemeClr val="bg1">
-                <a:lumMod val="50000"/>
-              </a:schemeClr>
-            </a:solidFill>
-          </a:ln>
-        </p:spPr>
-        <p:style>
-          <a:lnRef idx="2">
-            <a:schemeClr val="accent6">
-              <a:shade val="50000"/>
-            </a:schemeClr>
-          </a:lnRef>
-          <a:fillRef idx="1">
-            <a:schemeClr val="accent6"/>
-          </a:fillRef>
-          <a:effectRef idx="0">
-            <a:schemeClr val="accent6"/>
-          </a:effectRef>
-          <a:fontRef idx="minor">
-            <a:schemeClr val="lt1"/>
-          </a:fontRef>
-        </p:style>
-        <p:txBody>
-          <a:bodyPr rtlCol="0" anchor="ctr"/>
-          <a:lstStyle/>
-          <a:p>
-            <a:pPr algn="ctr"/>
-            <a:r>
-              <a:rPr lang="en-US" dirty="0" smtClean="0">
-                <a:solidFill>
-                  <a:srgbClr val="FF0000"/>
-                </a:solidFill>
-              </a:rPr>
-              <a:t>Queue</a:t>
-            </a:r>
-            <a:endParaRPr lang="en-US" dirty="0">
-              <a:solidFill>
-                <a:srgbClr val="FF0000"/>
-              </a:solidFill>
-            </a:endParaRPr>
-          </a:p>
-        </p:txBody>
-      </p:sp>
-      <p:sp>
-        <p:nvSpPr>
-          <p:cNvPr id="10" name="Left-Right Arrow 9"/>
-          <p:cNvSpPr/>
-          <p:nvPr/>
-        </p:nvSpPr>
-        <p:spPr>
-          <a:xfrm>
-            <a:off x="4196643" y="3781779"/>
-            <a:ext cx="747892" cy="254000"/>
-          </a:xfrm>
-          <a:prstGeom prst="leftRightArrow">
-            <a:avLst/>
-          </a:prstGeom>
-          <a:solidFill>
-            <a:schemeClr val="tx1"/>
-          </a:solidFill>
-          <a:ln>
-            <a:solidFill>
-              <a:schemeClr val="tx1"/>
-            </a:solidFill>
-          </a:ln>
-        </p:spPr>
-        <p:style>
-          <a:lnRef idx="2">
-            <a:schemeClr val="accent1">
-              <a:shade val="50000"/>
-            </a:schemeClr>
-          </a:lnRef>
-          <a:fillRef idx="1">
-            <a:schemeClr val="accent1"/>
-          </a:fillRef>
-          <a:effectRef idx="0">
-            <a:schemeClr val="accent1"/>
-          </a:effectRef>
-          <a:fontRef idx="minor">
-            <a:schemeClr val="lt1"/>
-          </a:fontRef>
-        </p:style>
-        <p:txBody>
-          <a:bodyPr rtlCol="0" anchor="ctr"/>
-          <a:lstStyle/>
-          <a:p>
-            <a:pPr algn="ctr"/>
-            <a:endParaRPr lang="en-US"/>
-          </a:p>
-        </p:txBody>
-      </p:sp>
-      <p:sp>
-        <p:nvSpPr>
-          <p:cNvPr id="11" name="Left-Right Arrow 10"/>
-          <p:cNvSpPr/>
-          <p:nvPr/>
-        </p:nvSpPr>
-        <p:spPr>
-          <a:xfrm rot="2695864">
-            <a:off x="1693334" y="3429004"/>
-            <a:ext cx="747892" cy="324556"/>
+            <a:off x="6293552" y="3753560"/>
+            <a:ext cx="1097851" cy="282220"/>
           </a:xfrm>
           <a:prstGeom prst="leftRightArrow">
             <a:avLst/>
@@ -6730,14 +5619,329 @@
       </p:sp>
       <p:sp>
         <p:nvSpPr>
-          <p:cNvPr id="12" name="Left-Right Arrow 11"/>
+          <p:cNvPr id="30" name="Left-Right Arrow 29"/>
           <p:cNvSpPr/>
           <p:nvPr/>
         </p:nvSpPr>
         <p:spPr>
-          <a:xfrm rot="19392402">
-            <a:off x="6564486" y="3358449"/>
-            <a:ext cx="747892" cy="324556"/>
+          <a:xfrm>
+            <a:off x="3993446" y="3753557"/>
+            <a:ext cx="1165574" cy="254000"/>
+          </a:xfrm>
+          <a:prstGeom prst="leftRightArrow">
+            <a:avLst/>
+          </a:prstGeom>
+          <a:solidFill>
+            <a:schemeClr val="tx1"/>
+          </a:solidFill>
+          <a:ln>
+            <a:solidFill>
+              <a:schemeClr val="tx1"/>
+            </a:solidFill>
+          </a:ln>
+        </p:spPr>
+        <p:style>
+          <a:lnRef idx="2">
+            <a:schemeClr val="accent1">
+              <a:shade val="50000"/>
+            </a:schemeClr>
+          </a:lnRef>
+          <a:fillRef idx="1">
+            <a:schemeClr val="accent1"/>
+          </a:fillRef>
+          <a:effectRef idx="0">
+            <a:schemeClr val="accent1"/>
+          </a:effectRef>
+          <a:fontRef idx="minor">
+            <a:schemeClr val="lt1"/>
+          </a:fontRef>
+        </p:style>
+        <p:txBody>
+          <a:bodyPr rtlCol="0" anchor="ctr"/>
+          <a:lstStyle/>
+          <a:p>
+            <a:pPr algn="ctr"/>
+            <a:endParaRPr lang="en-US"/>
+          </a:p>
+        </p:txBody>
+      </p:sp>
+      <p:sp>
+        <p:nvSpPr>
+          <p:cNvPr id="31" name="Oval 30"/>
+          <p:cNvSpPr/>
+          <p:nvPr/>
+        </p:nvSpPr>
+        <p:spPr>
+          <a:xfrm>
+            <a:off x="2878667" y="3626556"/>
+            <a:ext cx="1078088" cy="508000"/>
+          </a:xfrm>
+          <a:prstGeom prst="ellipse">
+            <a:avLst/>
+          </a:prstGeom>
+          <a:ln/>
+        </p:spPr>
+        <p:style>
+          <a:lnRef idx="2">
+            <a:schemeClr val="accent3">
+              <a:shade val="50000"/>
+            </a:schemeClr>
+          </a:lnRef>
+          <a:fillRef idx="1">
+            <a:schemeClr val="accent3"/>
+          </a:fillRef>
+          <a:effectRef idx="0">
+            <a:schemeClr val="accent3"/>
+          </a:effectRef>
+          <a:fontRef idx="minor">
+            <a:schemeClr val="lt1"/>
+          </a:fontRef>
+        </p:style>
+        <p:txBody>
+          <a:bodyPr rtlCol="0" anchor="ctr"/>
+          <a:lstStyle/>
+          <a:p>
+            <a:pPr algn="ctr"/>
+            <a:endParaRPr lang="en-US" dirty="0"/>
+          </a:p>
+        </p:txBody>
+      </p:sp>
+      <p:sp>
+        <p:nvSpPr>
+          <p:cNvPr id="32" name="Oval 31"/>
+          <p:cNvSpPr/>
+          <p:nvPr/>
+        </p:nvSpPr>
+        <p:spPr>
+          <a:xfrm>
+            <a:off x="5187242" y="3626557"/>
+            <a:ext cx="1078088" cy="508000"/>
+          </a:xfrm>
+          <a:prstGeom prst="ellipse">
+            <a:avLst/>
+          </a:prstGeom>
+          <a:ln/>
+        </p:spPr>
+        <p:style>
+          <a:lnRef idx="2">
+            <a:schemeClr val="accent3">
+              <a:shade val="50000"/>
+            </a:schemeClr>
+          </a:lnRef>
+          <a:fillRef idx="1">
+            <a:schemeClr val="accent3"/>
+          </a:fillRef>
+          <a:effectRef idx="0">
+            <a:schemeClr val="accent3"/>
+          </a:effectRef>
+          <a:fontRef idx="minor">
+            <a:schemeClr val="lt1"/>
+          </a:fontRef>
+        </p:style>
+        <p:txBody>
+          <a:bodyPr rtlCol="0" anchor="ctr"/>
+          <a:lstStyle/>
+          <a:p>
+            <a:pPr algn="ctr"/>
+            <a:endParaRPr lang="en-US" dirty="0"/>
+          </a:p>
+        </p:txBody>
+      </p:sp>
+    </p:spTree>
+    <p:extLst>
+      <p:ext uri="{BB962C8B-B14F-4D97-AF65-F5344CB8AC3E}">
+        <p14:creationId xmlns:p14="http://schemas.microsoft.com/office/powerpoint/2010/main" val="394938149"/>
+      </p:ext>
+    </p:extLst>
+  </p:cSld>
+  <p:clrMapOvr>
+    <a:masterClrMapping/>
+  </p:clrMapOvr>
+  <p:timing>
+    <p:tnLst>
+      <p:par>
+        <p:cTn xmlns:p14="http://schemas.microsoft.com/office/powerpoint/2010/main" id="1" dur="indefinite" restart="never" nodeType="tmRoot"/>
+      </p:par>
+    </p:tnLst>
+  </p:timing>
+</p:sld>
+</file>
+
+<file path=ppt/slides/slide7.xml><?xml version="1.0" encoding="utf-8"?>
+<p:sld xmlns:a="http://schemas.openxmlformats.org/drawingml/2006/main" xmlns:r="http://schemas.openxmlformats.org/officeDocument/2006/relationships" xmlns:p="http://schemas.openxmlformats.org/presentationml/2006/main">
+  <p:cSld>
+    <p:spTree>
+      <p:nvGrpSpPr>
+        <p:cNvPr id="1" name=""/>
+        <p:cNvGrpSpPr/>
+        <p:nvPr/>
+      </p:nvGrpSpPr>
+      <p:grpSpPr>
+        <a:xfrm>
+          <a:off x="0" y="0"/>
+          <a:ext cx="0" cy="0"/>
+          <a:chOff x="0" y="0"/>
+          <a:chExt cx="0" cy="0"/>
+        </a:xfrm>
+      </p:grpSpPr>
+      <p:sp>
+        <p:nvSpPr>
+          <p:cNvPr id="2" name="Title 1"/>
+          <p:cNvSpPr>
+            <a:spLocks noGrp="1"/>
+          </p:cNvSpPr>
+          <p:nvPr>
+            <p:ph type="title"/>
+          </p:nvPr>
+        </p:nvSpPr>
+        <p:spPr/>
+        <p:txBody>
+          <a:bodyPr/>
+          <a:lstStyle/>
+          <a:p>
+            <a:r>
+              <a:rPr lang="en-US" dirty="0"/>
+              <a:t>Evaluation Scenarios </a:t>
+            </a:r>
+            <a:r>
+              <a:rPr lang="en-US" dirty="0" smtClean="0"/>
+              <a:t>(3/</a:t>
+            </a:r>
+            <a:r>
+              <a:rPr lang="en-US" dirty="0"/>
+              <a:t>4)</a:t>
+            </a:r>
+          </a:p>
+        </p:txBody>
+      </p:sp>
+      <p:sp>
+        <p:nvSpPr>
+          <p:cNvPr id="3" name="Content Placeholder 2"/>
+          <p:cNvSpPr>
+            <a:spLocks noGrp="1"/>
+          </p:cNvSpPr>
+          <p:nvPr>
+            <p:ph idx="1"/>
+          </p:nvPr>
+        </p:nvSpPr>
+        <p:spPr/>
+        <p:txBody>
+          <a:bodyPr/>
+          <a:lstStyle/>
+          <a:p>
+            <a:r>
+              <a:rPr lang="en-US" dirty="0"/>
+              <a:t>Self-fairness</a:t>
+            </a:r>
+          </a:p>
+          <a:p>
+            <a:pPr marL="0" indent="0">
+              <a:buNone/>
+            </a:pPr>
+            <a:endParaRPr lang="en-US" dirty="0"/>
+          </a:p>
+        </p:txBody>
+      </p:sp>
+      <p:sp>
+        <p:nvSpPr>
+          <p:cNvPr id="4" name="Oval 3"/>
+          <p:cNvSpPr/>
+          <p:nvPr/>
+        </p:nvSpPr>
+        <p:spPr>
+          <a:xfrm>
+            <a:off x="945445" y="2892779"/>
+            <a:ext cx="776111" cy="733777"/>
+          </a:xfrm>
+          <a:prstGeom prst="ellipse">
+            <a:avLst/>
+          </a:prstGeom>
+          <a:ln/>
+        </p:spPr>
+        <p:style>
+          <a:lnRef idx="2">
+            <a:schemeClr val="accent2">
+              <a:shade val="50000"/>
+            </a:schemeClr>
+          </a:lnRef>
+          <a:fillRef idx="1">
+            <a:schemeClr val="accent2"/>
+          </a:fillRef>
+          <a:effectRef idx="0">
+            <a:schemeClr val="accent2"/>
+          </a:effectRef>
+          <a:fontRef idx="minor">
+            <a:schemeClr val="lt1"/>
+          </a:fontRef>
+        </p:style>
+        <p:txBody>
+          <a:bodyPr rtlCol="0" anchor="ctr"/>
+          <a:lstStyle/>
+          <a:p>
+            <a:pPr algn="ctr"/>
+            <a:r>
+              <a:rPr lang="en-US" dirty="0" smtClean="0"/>
+              <a:t>RTP</a:t>
+            </a:r>
+            <a:endParaRPr lang="en-US" dirty="0"/>
+          </a:p>
+        </p:txBody>
+      </p:sp>
+      <p:sp>
+        <p:nvSpPr>
+          <p:cNvPr id="5" name="Oval 4"/>
+          <p:cNvSpPr/>
+          <p:nvPr/>
+        </p:nvSpPr>
+        <p:spPr>
+          <a:xfrm>
+            <a:off x="7335082" y="2963337"/>
+            <a:ext cx="776111" cy="733777"/>
+          </a:xfrm>
+          <a:prstGeom prst="ellipse">
+            <a:avLst/>
+          </a:prstGeom>
+          <a:ln/>
+        </p:spPr>
+        <p:style>
+          <a:lnRef idx="2">
+            <a:schemeClr val="accent2">
+              <a:shade val="50000"/>
+            </a:schemeClr>
+          </a:lnRef>
+          <a:fillRef idx="1">
+            <a:schemeClr val="accent2"/>
+          </a:fillRef>
+          <a:effectRef idx="0">
+            <a:schemeClr val="accent2"/>
+          </a:effectRef>
+          <a:fontRef idx="minor">
+            <a:schemeClr val="lt1"/>
+          </a:fontRef>
+        </p:style>
+        <p:txBody>
+          <a:bodyPr rtlCol="0" anchor="ctr"/>
+          <a:lstStyle/>
+          <a:p>
+            <a:pPr algn="ctr"/>
+            <a:r>
+              <a:rPr lang="en-US" dirty="0" smtClean="0"/>
+              <a:t>RTP</a:t>
+            </a:r>
+            <a:endParaRPr lang="en-US" dirty="0"/>
+          </a:p>
+        </p:txBody>
+      </p:sp>
+      <p:sp>
+        <p:nvSpPr>
+          <p:cNvPr id="11" name="Left-Right Arrow 10"/>
+          <p:cNvSpPr/>
+          <p:nvPr/>
+        </p:nvSpPr>
+        <p:spPr>
+          <a:xfrm rot="1215948">
+            <a:off x="1694499" y="3394265"/>
+            <a:ext cx="1107610" cy="395569"/>
           </a:xfrm>
           <a:prstGeom prst="leftRightArrow">
             <a:avLst/>
@@ -6939,9 +6143,9 @@
           <p:nvPr/>
         </p:nvSpPr>
         <p:spPr>
-          <a:xfrm rot="19392402">
-            <a:off x="1676033" y="4066290"/>
-            <a:ext cx="747892" cy="324556"/>
+          <a:xfrm rot="20442351">
+            <a:off x="1641810" y="3994087"/>
+            <a:ext cx="1165849" cy="371739"/>
           </a:xfrm>
           <a:prstGeom prst="leftRightArrow">
             <a:avLst/>
@@ -6986,14 +6190,348 @@
       </p:sp>
       <p:sp>
         <p:nvSpPr>
-          <p:cNvPr id="18" name="Left-Right Arrow 17"/>
+          <p:cNvPr id="19" name="Oval 18"/>
           <p:cNvSpPr/>
           <p:nvPr/>
         </p:nvSpPr>
         <p:spPr>
-          <a:xfrm rot="2695864">
-            <a:off x="6620691" y="4069447"/>
-            <a:ext cx="747892" cy="324556"/>
+          <a:xfrm>
+            <a:off x="7349193" y="4078112"/>
+            <a:ext cx="776111" cy="733777"/>
+          </a:xfrm>
+          <a:prstGeom prst="ellipse">
+            <a:avLst/>
+          </a:prstGeom>
+          <a:ln/>
+        </p:spPr>
+        <p:style>
+          <a:lnRef idx="2">
+            <a:schemeClr val="accent2">
+              <a:shade val="50000"/>
+            </a:schemeClr>
+          </a:lnRef>
+          <a:fillRef idx="1">
+            <a:schemeClr val="accent2"/>
+          </a:fillRef>
+          <a:effectRef idx="0">
+            <a:schemeClr val="accent2"/>
+          </a:effectRef>
+          <a:fontRef idx="minor">
+            <a:schemeClr val="lt1"/>
+          </a:fontRef>
+        </p:style>
+        <p:txBody>
+          <a:bodyPr rtlCol="0" anchor="ctr"/>
+          <a:lstStyle/>
+          <a:p>
+            <a:pPr algn="ctr"/>
+            <a:r>
+              <a:rPr lang="en-US" dirty="0" smtClean="0"/>
+              <a:t>RTP</a:t>
+            </a:r>
+            <a:endParaRPr lang="en-US" dirty="0"/>
+          </a:p>
+        </p:txBody>
+      </p:sp>
+      <p:sp>
+        <p:nvSpPr>
+          <p:cNvPr id="20" name="Oval 19"/>
+          <p:cNvSpPr/>
+          <p:nvPr/>
+        </p:nvSpPr>
+        <p:spPr>
+          <a:xfrm>
+            <a:off x="954154" y="4078112"/>
+            <a:ext cx="776111" cy="733777"/>
+          </a:xfrm>
+          <a:prstGeom prst="ellipse">
+            <a:avLst/>
+          </a:prstGeom>
+          <a:ln/>
+        </p:spPr>
+        <p:style>
+          <a:lnRef idx="2">
+            <a:schemeClr val="accent2">
+              <a:shade val="50000"/>
+            </a:schemeClr>
+          </a:lnRef>
+          <a:fillRef idx="1">
+            <a:schemeClr val="accent2"/>
+          </a:fillRef>
+          <a:effectRef idx="0">
+            <a:schemeClr val="accent2"/>
+          </a:effectRef>
+          <a:fontRef idx="minor">
+            <a:schemeClr val="lt1"/>
+          </a:fontRef>
+        </p:style>
+        <p:txBody>
+          <a:bodyPr rtlCol="0" anchor="ctr"/>
+          <a:lstStyle/>
+          <a:p>
+            <a:pPr algn="ctr"/>
+            <a:r>
+              <a:rPr lang="en-US" dirty="0" smtClean="0"/>
+              <a:t>RTP</a:t>
+            </a:r>
+            <a:endParaRPr lang="en-US" dirty="0"/>
+          </a:p>
+        </p:txBody>
+      </p:sp>
+      <p:sp>
+        <p:nvSpPr>
+          <p:cNvPr id="21" name="Double Bracket 20"/>
+          <p:cNvSpPr/>
+          <p:nvPr/>
+        </p:nvSpPr>
+        <p:spPr>
+          <a:xfrm>
+            <a:off x="7478889" y="3781779"/>
+            <a:ext cx="479778" cy="188491"/>
+          </a:xfrm>
+          <a:prstGeom prst="bracketPair">
+            <a:avLst/>
+          </a:prstGeom>
+        </p:spPr>
+        <p:style>
+          <a:lnRef idx="1">
+            <a:schemeClr val="dk1"/>
+          </a:lnRef>
+          <a:fillRef idx="0">
+            <a:schemeClr val="dk1"/>
+          </a:fillRef>
+          <a:effectRef idx="0">
+            <a:schemeClr val="dk1"/>
+          </a:effectRef>
+          <a:fontRef idx="minor">
+            <a:schemeClr val="tx1"/>
+          </a:fontRef>
+        </p:style>
+        <p:txBody>
+          <a:bodyPr rtlCol="0" anchor="b"/>
+          <a:lstStyle/>
+          <a:p>
+            <a:pPr algn="ctr"/>
+            <a:r>
+              <a:rPr lang="en-US" b="1" dirty="0" smtClean="0"/>
+              <a:t>…</a:t>
+            </a:r>
+            <a:endParaRPr lang="en-US" b="1" dirty="0"/>
+          </a:p>
+        </p:txBody>
+      </p:sp>
+      <p:sp>
+        <p:nvSpPr>
+          <p:cNvPr id="23" name="Double Bracket 22"/>
+          <p:cNvSpPr/>
+          <p:nvPr/>
+        </p:nvSpPr>
+        <p:spPr>
+          <a:xfrm>
+            <a:off x="1117107" y="3737822"/>
+            <a:ext cx="479778" cy="188491"/>
+          </a:xfrm>
+          <a:prstGeom prst="bracketPair">
+            <a:avLst/>
+          </a:prstGeom>
+        </p:spPr>
+        <p:style>
+          <a:lnRef idx="1">
+            <a:schemeClr val="dk1"/>
+          </a:lnRef>
+          <a:fillRef idx="0">
+            <a:schemeClr val="dk1"/>
+          </a:fillRef>
+          <a:effectRef idx="0">
+            <a:schemeClr val="dk1"/>
+          </a:effectRef>
+          <a:fontRef idx="minor">
+            <a:schemeClr val="tx1"/>
+          </a:fontRef>
+        </p:style>
+        <p:txBody>
+          <a:bodyPr rtlCol="0" anchor="b"/>
+          <a:lstStyle/>
+          <a:p>
+            <a:pPr algn="ctr"/>
+            <a:r>
+              <a:rPr lang="en-US" b="1" dirty="0" smtClean="0"/>
+              <a:t>…</a:t>
+            </a:r>
+            <a:endParaRPr lang="en-US" b="1" dirty="0"/>
+          </a:p>
+        </p:txBody>
+      </p:sp>
+      <p:sp>
+        <p:nvSpPr>
+          <p:cNvPr id="24" name="TextBox 23"/>
+          <p:cNvSpPr txBox="1"/>
+          <p:nvPr/>
+        </p:nvSpPr>
+        <p:spPr>
+          <a:xfrm>
+            <a:off x="1653329" y="4811888"/>
+            <a:ext cx="2086115" cy="923330"/>
+          </a:xfrm>
+          <a:prstGeom prst="rect">
+            <a:avLst/>
+          </a:prstGeom>
+          <a:noFill/>
+        </p:spPr>
+        <p:txBody>
+          <a:bodyPr wrap="square" rtlCol="0">
+            <a:spAutoFit/>
+          </a:bodyPr>
+          <a:lstStyle/>
+          <a:p>
+            <a:r>
+              <a:rPr lang="en-US" dirty="0" smtClean="0"/>
+              <a:t>These links can have same or different path properties</a:t>
+            </a:r>
+            <a:endParaRPr lang="en-US" dirty="0"/>
+          </a:p>
+        </p:txBody>
+      </p:sp>
+      <p:sp>
+        <p:nvSpPr>
+          <p:cNvPr id="26" name="Left-Right Arrow 25"/>
+          <p:cNvSpPr/>
+          <p:nvPr/>
+        </p:nvSpPr>
+        <p:spPr>
+          <a:xfrm>
+            <a:off x="3951113" y="3753557"/>
+            <a:ext cx="1165574" cy="254000"/>
+          </a:xfrm>
+          <a:prstGeom prst="leftRightArrow">
+            <a:avLst/>
+          </a:prstGeom>
+          <a:solidFill>
+            <a:schemeClr val="tx1"/>
+          </a:solidFill>
+          <a:ln>
+            <a:solidFill>
+              <a:schemeClr val="tx1"/>
+            </a:solidFill>
+          </a:ln>
+        </p:spPr>
+        <p:style>
+          <a:lnRef idx="2">
+            <a:schemeClr val="accent1">
+              <a:shade val="50000"/>
+            </a:schemeClr>
+          </a:lnRef>
+          <a:fillRef idx="1">
+            <a:schemeClr val="accent1"/>
+          </a:fillRef>
+          <a:effectRef idx="0">
+            <a:schemeClr val="accent1"/>
+          </a:effectRef>
+          <a:fontRef idx="minor">
+            <a:schemeClr val="lt1"/>
+          </a:fontRef>
+        </p:style>
+        <p:txBody>
+          <a:bodyPr rtlCol="0" anchor="ctr"/>
+          <a:lstStyle/>
+          <a:p>
+            <a:pPr algn="ctr"/>
+            <a:endParaRPr lang="en-US"/>
+          </a:p>
+        </p:txBody>
+      </p:sp>
+      <p:sp>
+        <p:nvSpPr>
+          <p:cNvPr id="27" name="Oval 26"/>
+          <p:cNvSpPr/>
+          <p:nvPr/>
+        </p:nvSpPr>
+        <p:spPr>
+          <a:xfrm>
+            <a:off x="2794001" y="3626556"/>
+            <a:ext cx="1078088" cy="508000"/>
+          </a:xfrm>
+          <a:prstGeom prst="ellipse">
+            <a:avLst/>
+          </a:prstGeom>
+          <a:ln/>
+        </p:spPr>
+        <p:style>
+          <a:lnRef idx="2">
+            <a:schemeClr val="accent3">
+              <a:shade val="50000"/>
+            </a:schemeClr>
+          </a:lnRef>
+          <a:fillRef idx="1">
+            <a:schemeClr val="accent3"/>
+          </a:fillRef>
+          <a:effectRef idx="0">
+            <a:schemeClr val="accent3"/>
+          </a:effectRef>
+          <a:fontRef idx="minor">
+            <a:schemeClr val="lt1"/>
+          </a:fontRef>
+        </p:style>
+        <p:txBody>
+          <a:bodyPr rtlCol="0" anchor="ctr"/>
+          <a:lstStyle/>
+          <a:p>
+            <a:pPr algn="ctr"/>
+            <a:endParaRPr lang="en-US" dirty="0"/>
+          </a:p>
+        </p:txBody>
+      </p:sp>
+      <p:sp>
+        <p:nvSpPr>
+          <p:cNvPr id="28" name="Oval 27"/>
+          <p:cNvSpPr/>
+          <p:nvPr/>
+        </p:nvSpPr>
+        <p:spPr>
+          <a:xfrm>
+            <a:off x="5173131" y="3626557"/>
+            <a:ext cx="1078088" cy="508000"/>
+          </a:xfrm>
+          <a:prstGeom prst="ellipse">
+            <a:avLst/>
+          </a:prstGeom>
+          <a:ln/>
+        </p:spPr>
+        <p:style>
+          <a:lnRef idx="2">
+            <a:schemeClr val="accent3">
+              <a:shade val="50000"/>
+            </a:schemeClr>
+          </a:lnRef>
+          <a:fillRef idx="1">
+            <a:schemeClr val="accent3"/>
+          </a:fillRef>
+          <a:effectRef idx="0">
+            <a:schemeClr val="accent3"/>
+          </a:effectRef>
+          <a:fontRef idx="minor">
+            <a:schemeClr val="lt1"/>
+          </a:fontRef>
+        </p:style>
+        <p:txBody>
+          <a:bodyPr rtlCol="0" anchor="ctr"/>
+          <a:lstStyle/>
+          <a:p>
+            <a:pPr algn="ctr"/>
+            <a:endParaRPr lang="en-US" dirty="0"/>
+          </a:p>
+        </p:txBody>
+      </p:sp>
+      <p:sp>
+        <p:nvSpPr>
+          <p:cNvPr id="29" name="Left-Right Arrow 28"/>
+          <p:cNvSpPr/>
+          <p:nvPr/>
+        </p:nvSpPr>
+        <p:spPr>
+          <a:xfrm rot="1215948">
+            <a:off x="6209133" y="4091783"/>
+            <a:ext cx="1107610" cy="395569"/>
           </a:xfrm>
           <a:prstGeom prst="leftRightArrow">
             <a:avLst/>
@@ -7038,31 +6576,42 @@
       </p:sp>
       <p:sp>
         <p:nvSpPr>
-          <p:cNvPr id="19" name="Oval 18"/>
+          <p:cNvPr id="30" name="Left-Right Arrow 29"/>
           <p:cNvSpPr/>
           <p:nvPr/>
         </p:nvSpPr>
         <p:spPr>
-          <a:xfrm>
-            <a:off x="7349193" y="4078112"/>
-            <a:ext cx="776111" cy="733777"/>
+          <a:xfrm rot="20442351">
+            <a:off x="6217694" y="3405613"/>
+            <a:ext cx="1165849" cy="371739"/>
           </a:xfrm>
-          <a:prstGeom prst="ellipse">
+          <a:prstGeom prst="leftRightArrow">
             <a:avLst/>
           </a:prstGeom>
-          <a:ln/>
+          <a:solidFill>
+            <a:schemeClr val="bg1">
+              <a:lumMod val="50000"/>
+            </a:schemeClr>
+          </a:solidFill>
+          <a:ln>
+            <a:solidFill>
+              <a:schemeClr val="bg1">
+                <a:lumMod val="50000"/>
+              </a:schemeClr>
+            </a:solidFill>
+          </a:ln>
         </p:spPr>
         <p:style>
           <a:lnRef idx="2">
-            <a:schemeClr val="accent2">
+            <a:schemeClr val="accent1">
               <a:shade val="50000"/>
             </a:schemeClr>
           </a:lnRef>
           <a:fillRef idx="1">
-            <a:schemeClr val="accent2"/>
+            <a:schemeClr val="accent1"/>
           </a:fillRef>
           <a:effectRef idx="0">
-            <a:schemeClr val="accent2"/>
+            <a:schemeClr val="accent1"/>
           </a:effectRef>
           <a:fontRef idx="minor">
             <a:schemeClr val="lt1"/>
@@ -7073,170 +6622,7 @@
           <a:lstStyle/>
           <a:p>
             <a:pPr algn="ctr"/>
-            <a:r>
-              <a:rPr lang="en-US" dirty="0" smtClean="0"/>
-              <a:t>RTP</a:t>
-            </a:r>
-            <a:endParaRPr lang="en-US" dirty="0"/>
-          </a:p>
-        </p:txBody>
-      </p:sp>
-      <p:sp>
-        <p:nvSpPr>
-          <p:cNvPr id="20" name="Oval 19"/>
-          <p:cNvSpPr/>
-          <p:nvPr/>
-        </p:nvSpPr>
-        <p:spPr>
-          <a:xfrm>
-            <a:off x="954154" y="4078112"/>
-            <a:ext cx="776111" cy="733777"/>
-          </a:xfrm>
-          <a:prstGeom prst="ellipse">
-            <a:avLst/>
-          </a:prstGeom>
-          <a:ln/>
-        </p:spPr>
-        <p:style>
-          <a:lnRef idx="2">
-            <a:schemeClr val="accent2">
-              <a:shade val="50000"/>
-            </a:schemeClr>
-          </a:lnRef>
-          <a:fillRef idx="1">
-            <a:schemeClr val="accent2"/>
-          </a:fillRef>
-          <a:effectRef idx="0">
-            <a:schemeClr val="accent2"/>
-          </a:effectRef>
-          <a:fontRef idx="minor">
-            <a:schemeClr val="lt1"/>
-          </a:fontRef>
-        </p:style>
-        <p:txBody>
-          <a:bodyPr rtlCol="0" anchor="ctr"/>
-          <a:lstStyle/>
-          <a:p>
-            <a:pPr algn="ctr"/>
-            <a:r>
-              <a:rPr lang="en-US" dirty="0" smtClean="0"/>
-              <a:t>RTP</a:t>
-            </a:r>
-            <a:endParaRPr lang="en-US" dirty="0"/>
-          </a:p>
-        </p:txBody>
-      </p:sp>
-      <p:sp>
-        <p:nvSpPr>
-          <p:cNvPr id="21" name="Double Bracket 20"/>
-          <p:cNvSpPr/>
-          <p:nvPr/>
-        </p:nvSpPr>
-        <p:spPr>
-          <a:xfrm>
-            <a:off x="7478889" y="3781779"/>
-            <a:ext cx="479778" cy="188491"/>
-          </a:xfrm>
-          <a:prstGeom prst="bracketPair">
-            <a:avLst/>
-          </a:prstGeom>
-        </p:spPr>
-        <p:style>
-          <a:lnRef idx="1">
-            <a:schemeClr val="dk1"/>
-          </a:lnRef>
-          <a:fillRef idx="0">
-            <a:schemeClr val="dk1"/>
-          </a:fillRef>
-          <a:effectRef idx="0">
-            <a:schemeClr val="dk1"/>
-          </a:effectRef>
-          <a:fontRef idx="minor">
-            <a:schemeClr val="tx1"/>
-          </a:fontRef>
-        </p:style>
-        <p:txBody>
-          <a:bodyPr rtlCol="0" anchor="b"/>
-          <a:lstStyle/>
-          <a:p>
-            <a:pPr algn="ctr"/>
-            <a:r>
-              <a:rPr lang="en-US" b="1" dirty="0" smtClean="0"/>
-              <a:t>…</a:t>
-            </a:r>
-            <a:endParaRPr lang="en-US" b="1" dirty="0"/>
-          </a:p>
-        </p:txBody>
-      </p:sp>
-      <p:sp>
-        <p:nvSpPr>
-          <p:cNvPr id="23" name="Double Bracket 22"/>
-          <p:cNvSpPr/>
-          <p:nvPr/>
-        </p:nvSpPr>
-        <p:spPr>
-          <a:xfrm>
-            <a:off x="1117107" y="3737822"/>
-            <a:ext cx="479778" cy="188491"/>
-          </a:xfrm>
-          <a:prstGeom prst="bracketPair">
-            <a:avLst/>
-          </a:prstGeom>
-        </p:spPr>
-        <p:style>
-          <a:lnRef idx="1">
-            <a:schemeClr val="dk1"/>
-          </a:lnRef>
-          <a:fillRef idx="0">
-            <a:schemeClr val="dk1"/>
-          </a:fillRef>
-          <a:effectRef idx="0">
-            <a:schemeClr val="dk1"/>
-          </a:effectRef>
-          <a:fontRef idx="minor">
-            <a:schemeClr val="tx1"/>
-          </a:fontRef>
-        </p:style>
-        <p:txBody>
-          <a:bodyPr rtlCol="0" anchor="b"/>
-          <a:lstStyle/>
-          <a:p>
-            <a:pPr algn="ctr"/>
-            <a:r>
-              <a:rPr lang="en-US" b="1" dirty="0" smtClean="0"/>
-              <a:t>…</a:t>
-            </a:r>
-            <a:endParaRPr lang="en-US" b="1" dirty="0"/>
-          </a:p>
-        </p:txBody>
-      </p:sp>
-      <p:sp>
-        <p:nvSpPr>
-          <p:cNvPr id="24" name="TextBox 23"/>
-          <p:cNvSpPr txBox="1"/>
-          <p:nvPr/>
-        </p:nvSpPr>
-        <p:spPr>
-          <a:xfrm>
-            <a:off x="1653329" y="4811888"/>
-            <a:ext cx="2086115" cy="923330"/>
-          </a:xfrm>
-          <a:prstGeom prst="rect">
-            <a:avLst/>
-          </a:prstGeom>
-          <a:noFill/>
-        </p:spPr>
-        <p:txBody>
-          <a:bodyPr wrap="square" rtlCol="0">
-            <a:spAutoFit/>
-          </a:bodyPr>
-          <a:lstStyle/>
-          <a:p>
-            <a:r>
-              <a:rPr lang="en-US" dirty="0" smtClean="0"/>
-              <a:t>These links can have same or different path properties</a:t>
-            </a:r>
-            <a:endParaRPr lang="en-US" dirty="0"/>
+            <a:endParaRPr lang="en-US"/>
           </a:p>
         </p:txBody>
       </p:sp>
@@ -7361,7 +6747,7 @@
         </p:nvSpPr>
         <p:spPr>
           <a:xfrm>
-            <a:off x="1736151" y="3697095"/>
+            <a:off x="1778484" y="3487424"/>
             <a:ext cx="776111" cy="733777"/>
           </a:xfrm>
           <a:prstGeom prst="ellipse">
@@ -7445,14 +6831,14 @@
       </p:sp>
       <p:sp>
         <p:nvSpPr>
-          <p:cNvPr id="6" name="Oval 5"/>
+          <p:cNvPr id="19" name="Oval 18"/>
           <p:cNvSpPr/>
           <p:nvPr/>
         </p:nvSpPr>
         <p:spPr>
           <a:xfrm>
-            <a:off x="3629377" y="4811880"/>
-            <a:ext cx="524933" cy="508000"/>
+            <a:off x="6513560" y="3515662"/>
+            <a:ext cx="776111" cy="733777"/>
           </a:xfrm>
           <a:prstGeom prst="ellipse">
             <a:avLst/>
@@ -7461,15 +6847,15 @@
         </p:spPr>
         <p:style>
           <a:lnRef idx="2">
-            <a:schemeClr val="accent3">
+            <a:schemeClr val="accent2">
               <a:shade val="50000"/>
             </a:schemeClr>
           </a:lnRef>
           <a:fillRef idx="1">
-            <a:schemeClr val="accent3"/>
+            <a:schemeClr val="accent2"/>
           </a:fillRef>
           <a:effectRef idx="0">
-            <a:schemeClr val="accent3"/>
+            <a:schemeClr val="accent2"/>
           </a:effectRef>
           <a:fontRef idx="minor">
             <a:schemeClr val="lt1"/>
@@ -7480,20 +6866,24 @@
           <a:lstStyle/>
           <a:p>
             <a:pPr algn="ctr"/>
+            <a:r>
+              <a:rPr lang="en-US" dirty="0" smtClean="0"/>
+              <a:t>RTP</a:t>
+            </a:r>
             <a:endParaRPr lang="en-US" dirty="0"/>
           </a:p>
         </p:txBody>
       </p:sp>
       <p:sp>
         <p:nvSpPr>
-          <p:cNvPr id="7" name="Oval 6"/>
+          <p:cNvPr id="20" name="Oval 19"/>
           <p:cNvSpPr/>
           <p:nvPr/>
         </p:nvSpPr>
         <p:spPr>
           <a:xfrm>
-            <a:off x="6090356" y="4811880"/>
-            <a:ext cx="524933" cy="508000"/>
+            <a:off x="1016483" y="4221201"/>
+            <a:ext cx="776111" cy="733777"/>
           </a:xfrm>
           <a:prstGeom prst="ellipse">
             <a:avLst/>
@@ -7502,15 +6892,15 @@
         </p:spPr>
         <p:style>
           <a:lnRef idx="2">
-            <a:schemeClr val="accent3">
+            <a:schemeClr val="accent2">
               <a:shade val="50000"/>
             </a:schemeClr>
           </a:lnRef>
           <a:fillRef idx="1">
-            <a:schemeClr val="accent3"/>
+            <a:schemeClr val="accent2"/>
           </a:fillRef>
           <a:effectRef idx="0">
-            <a:schemeClr val="accent3"/>
+            <a:schemeClr val="accent2"/>
           </a:effectRef>
           <a:fontRef idx="minor">
             <a:schemeClr val="lt1"/>
@@ -7521,46 +6911,127 @@
           <a:lstStyle/>
           <a:p>
             <a:pPr algn="ctr"/>
+            <a:r>
+              <a:rPr lang="en-US" dirty="0" smtClean="0"/>
+              <a:t>RTP</a:t>
+            </a:r>
             <a:endParaRPr lang="en-US" dirty="0"/>
           </a:p>
         </p:txBody>
       </p:sp>
       <p:sp>
         <p:nvSpPr>
-          <p:cNvPr id="8" name="Rectangle 7"/>
+          <p:cNvPr id="21" name="Double Bracket 20"/>
           <p:cNvSpPr/>
           <p:nvPr/>
         </p:nvSpPr>
         <p:spPr>
           <a:xfrm>
-            <a:off x="2511778" y="4896547"/>
-            <a:ext cx="1103488" cy="366889"/>
+            <a:off x="7346115" y="3960170"/>
+            <a:ext cx="479778" cy="188491"/>
           </a:xfrm>
-          <a:prstGeom prst="rect">
+          <a:prstGeom prst="bracketPair">
             <a:avLst/>
           </a:prstGeom>
-          <a:solidFill>
-            <a:srgbClr val="FFFF00"/>
-          </a:solidFill>
-          <a:ln>
-            <a:solidFill>
-              <a:schemeClr val="bg1">
-                <a:lumMod val="50000"/>
-              </a:schemeClr>
-            </a:solidFill>
-          </a:ln>
+        </p:spPr>
+        <p:style>
+          <a:lnRef idx="1">
+            <a:schemeClr val="dk1"/>
+          </a:lnRef>
+          <a:fillRef idx="0">
+            <a:schemeClr val="dk1"/>
+          </a:fillRef>
+          <a:effectRef idx="0">
+            <a:schemeClr val="dk1"/>
+          </a:effectRef>
+          <a:fontRef idx="minor">
+            <a:schemeClr val="tx1"/>
+          </a:fontRef>
+        </p:style>
+        <p:txBody>
+          <a:bodyPr rtlCol="0" anchor="b"/>
+          <a:lstStyle/>
+          <a:p>
+            <a:pPr algn="ctr"/>
+            <a:r>
+              <a:rPr lang="en-US" b="1" dirty="0" smtClean="0"/>
+              <a:t>…</a:t>
+            </a:r>
+            <a:endParaRPr lang="en-US" b="1" dirty="0"/>
+          </a:p>
+        </p:txBody>
+      </p:sp>
+      <p:sp>
+        <p:nvSpPr>
+          <p:cNvPr id="22" name="Double Bracket 21"/>
+          <p:cNvSpPr/>
+          <p:nvPr/>
+        </p:nvSpPr>
+        <p:spPr>
+          <a:xfrm>
+            <a:off x="1298706" y="3987356"/>
+            <a:ext cx="479778" cy="188491"/>
+          </a:xfrm>
+          <a:prstGeom prst="bracketPair">
+            <a:avLst/>
+          </a:prstGeom>
+        </p:spPr>
+        <p:style>
+          <a:lnRef idx="1">
+            <a:schemeClr val="dk1"/>
+          </a:lnRef>
+          <a:fillRef idx="0">
+            <a:schemeClr val="dk1"/>
+          </a:fillRef>
+          <a:effectRef idx="0">
+            <a:schemeClr val="dk1"/>
+          </a:effectRef>
+          <a:fontRef idx="minor">
+            <a:schemeClr val="tx1"/>
+          </a:fontRef>
+        </p:style>
+        <p:txBody>
+          <a:bodyPr rtlCol="0" anchor="b"/>
+          <a:lstStyle/>
+          <a:p>
+            <a:pPr algn="ctr"/>
+            <a:r>
+              <a:rPr lang="en-US" b="1" dirty="0" smtClean="0"/>
+              <a:t>…</a:t>
+            </a:r>
+            <a:endParaRPr lang="en-US" b="1" dirty="0"/>
+          </a:p>
+        </p:txBody>
+      </p:sp>
+      <p:sp>
+        <p:nvSpPr>
+          <p:cNvPr id="24" name="Snip Same Side Corner Rectangle 23"/>
+          <p:cNvSpPr/>
+          <p:nvPr/>
+        </p:nvSpPr>
+        <p:spPr>
+          <a:xfrm>
+            <a:off x="956483" y="5369271"/>
+            <a:ext cx="776111" cy="493889"/>
+          </a:xfrm>
+          <a:prstGeom prst="snip2SameRect">
+            <a:avLst>
+              <a:gd name="adj1" fmla="val 50000"/>
+              <a:gd name="adj2" fmla="val 50000"/>
+            </a:avLst>
+          </a:prstGeom>
         </p:spPr>
         <p:style>
           <a:lnRef idx="2">
-            <a:schemeClr val="accent6">
+            <a:schemeClr val="accent4">
               <a:shade val="50000"/>
             </a:schemeClr>
           </a:lnRef>
           <a:fillRef idx="1">
-            <a:schemeClr val="accent6"/>
+            <a:schemeClr val="accent4"/>
           </a:fillRef>
           <a:effectRef idx="0">
-            <a:schemeClr val="accent6"/>
+            <a:schemeClr val="accent4"/>
           </a:effectRef>
           <a:fontRef idx="minor">
             <a:schemeClr val="lt1"/>
@@ -7572,57 +7043,42 @@
           <a:p>
             <a:pPr algn="ctr"/>
             <a:r>
-              <a:rPr lang="en-US" dirty="0" smtClean="0">
-                <a:solidFill>
-                  <a:srgbClr val="FF0000"/>
-                </a:solidFill>
-              </a:rPr>
-              <a:t>Queue</a:t>
-            </a:r>
-            <a:endParaRPr lang="en-US" dirty="0">
-              <a:solidFill>
-                <a:srgbClr val="FF0000"/>
-              </a:solidFill>
-            </a:endParaRPr>
-          </a:p>
-        </p:txBody>
-      </p:sp>
-      <p:sp>
-        <p:nvSpPr>
-          <p:cNvPr id="9" name="Rectangle 8"/>
+              <a:rPr lang="en-US" dirty="0" smtClean="0"/>
+              <a:t>TCP</a:t>
+            </a:r>
+            <a:endParaRPr lang="en-US" dirty="0"/>
+          </a:p>
+        </p:txBody>
+      </p:sp>
+      <p:sp>
+        <p:nvSpPr>
+          <p:cNvPr id="25" name="Snip Same Side Corner Rectangle 24"/>
           <p:cNvSpPr/>
           <p:nvPr/>
         </p:nvSpPr>
         <p:spPr>
           <a:xfrm>
-            <a:off x="4986868" y="4896547"/>
-            <a:ext cx="1103488" cy="366889"/>
+            <a:off x="1404539" y="6180653"/>
+            <a:ext cx="776111" cy="493889"/>
           </a:xfrm>
-          <a:prstGeom prst="rect">
-            <a:avLst/>
+          <a:prstGeom prst="snip2SameRect">
+            <a:avLst>
+              <a:gd name="adj1" fmla="val 50000"/>
+              <a:gd name="adj2" fmla="val 50000"/>
+            </a:avLst>
           </a:prstGeom>
-          <a:solidFill>
-            <a:srgbClr val="FFFF00"/>
-          </a:solidFill>
-          <a:ln>
-            <a:solidFill>
-              <a:schemeClr val="bg1">
-                <a:lumMod val="50000"/>
-              </a:schemeClr>
-            </a:solidFill>
-          </a:ln>
         </p:spPr>
         <p:style>
           <a:lnRef idx="2">
-            <a:schemeClr val="accent6">
+            <a:schemeClr val="accent4">
               <a:shade val="50000"/>
             </a:schemeClr>
           </a:lnRef>
           <a:fillRef idx="1">
-            <a:schemeClr val="accent6"/>
+            <a:schemeClr val="accent4"/>
           </a:fillRef>
           <a:effectRef idx="0">
-            <a:schemeClr val="accent6"/>
+            <a:schemeClr val="accent4"/>
           </a:effectRef>
           <a:fontRef idx="minor">
             <a:schemeClr val="lt1"/>
@@ -7634,31 +7090,201 @@
           <a:p>
             <a:pPr algn="ctr"/>
             <a:r>
-              <a:rPr lang="en-US" dirty="0" smtClean="0">
-                <a:solidFill>
-                  <a:srgbClr val="FF0000"/>
-                </a:solidFill>
-              </a:rPr>
-              <a:t>Queue</a:t>
-            </a:r>
-            <a:endParaRPr lang="en-US" dirty="0">
-              <a:solidFill>
-                <a:srgbClr val="FF0000"/>
-              </a:solidFill>
-            </a:endParaRPr>
-          </a:p>
-        </p:txBody>
-      </p:sp>
-      <p:sp>
-        <p:nvSpPr>
-          <p:cNvPr id="10" name="Left-Right Arrow 9"/>
+              <a:rPr lang="en-US" dirty="0" smtClean="0"/>
+              <a:t>TCP</a:t>
+            </a:r>
+            <a:endParaRPr lang="en-US" dirty="0"/>
+          </a:p>
+        </p:txBody>
+      </p:sp>
+      <p:sp>
+        <p:nvSpPr>
+          <p:cNvPr id="26" name="Double Bracket 25"/>
           <p:cNvSpPr/>
           <p:nvPr/>
         </p:nvSpPr>
         <p:spPr>
           <a:xfrm>
-            <a:off x="4196643" y="4967103"/>
-            <a:ext cx="747892" cy="254000"/>
+            <a:off x="1270968" y="5945300"/>
+            <a:ext cx="479778" cy="188491"/>
+          </a:xfrm>
+          <a:prstGeom prst="bracketPair">
+            <a:avLst/>
+          </a:prstGeom>
+        </p:spPr>
+        <p:style>
+          <a:lnRef idx="1">
+            <a:schemeClr val="dk1"/>
+          </a:lnRef>
+          <a:fillRef idx="0">
+            <a:schemeClr val="dk1"/>
+          </a:fillRef>
+          <a:effectRef idx="0">
+            <a:schemeClr val="dk1"/>
+          </a:effectRef>
+          <a:fontRef idx="minor">
+            <a:schemeClr val="tx1"/>
+          </a:fontRef>
+        </p:style>
+        <p:txBody>
+          <a:bodyPr rtlCol="0" anchor="b"/>
+          <a:lstStyle/>
+          <a:p>
+            <a:pPr algn="ctr"/>
+            <a:r>
+              <a:rPr lang="en-US" b="1" dirty="0" smtClean="0"/>
+              <a:t>…</a:t>
+            </a:r>
+            <a:endParaRPr lang="en-US" b="1" dirty="0"/>
+          </a:p>
+        </p:txBody>
+      </p:sp>
+      <p:sp>
+        <p:nvSpPr>
+          <p:cNvPr id="27" name="Snip Same Side Corner Rectangle 26"/>
+          <p:cNvSpPr/>
+          <p:nvPr/>
+        </p:nvSpPr>
+        <p:spPr>
+          <a:xfrm>
+            <a:off x="7335082" y="5243415"/>
+            <a:ext cx="776111" cy="493889"/>
+          </a:xfrm>
+          <a:prstGeom prst="snip2SameRect">
+            <a:avLst>
+              <a:gd name="adj1" fmla="val 50000"/>
+              <a:gd name="adj2" fmla="val 50000"/>
+            </a:avLst>
+          </a:prstGeom>
+        </p:spPr>
+        <p:style>
+          <a:lnRef idx="2">
+            <a:schemeClr val="accent4">
+              <a:shade val="50000"/>
+            </a:schemeClr>
+          </a:lnRef>
+          <a:fillRef idx="1">
+            <a:schemeClr val="accent4"/>
+          </a:fillRef>
+          <a:effectRef idx="0">
+            <a:schemeClr val="accent4"/>
+          </a:effectRef>
+          <a:fontRef idx="minor">
+            <a:schemeClr val="lt1"/>
+          </a:fontRef>
+        </p:style>
+        <p:txBody>
+          <a:bodyPr rtlCol="0" anchor="ctr"/>
+          <a:lstStyle/>
+          <a:p>
+            <a:pPr algn="ctr"/>
+            <a:r>
+              <a:rPr lang="en-US" dirty="0" smtClean="0"/>
+              <a:t>TCP</a:t>
+            </a:r>
+            <a:endParaRPr lang="en-US" dirty="0"/>
+          </a:p>
+        </p:txBody>
+      </p:sp>
+      <p:sp>
+        <p:nvSpPr>
+          <p:cNvPr id="28" name="Snip Same Side Corner Rectangle 27"/>
+          <p:cNvSpPr/>
+          <p:nvPr/>
+        </p:nvSpPr>
+        <p:spPr>
+          <a:xfrm>
+            <a:off x="6615289" y="6126163"/>
+            <a:ext cx="776111" cy="493889"/>
+          </a:xfrm>
+          <a:prstGeom prst="snip2SameRect">
+            <a:avLst>
+              <a:gd name="adj1" fmla="val 50000"/>
+              <a:gd name="adj2" fmla="val 50000"/>
+            </a:avLst>
+          </a:prstGeom>
+        </p:spPr>
+        <p:style>
+          <a:lnRef idx="2">
+            <a:schemeClr val="accent4">
+              <a:shade val="50000"/>
+            </a:schemeClr>
+          </a:lnRef>
+          <a:fillRef idx="1">
+            <a:schemeClr val="accent4"/>
+          </a:fillRef>
+          <a:effectRef idx="0">
+            <a:schemeClr val="accent4"/>
+          </a:effectRef>
+          <a:fontRef idx="minor">
+            <a:schemeClr val="lt1"/>
+          </a:fontRef>
+        </p:style>
+        <p:txBody>
+          <a:bodyPr rtlCol="0" anchor="ctr"/>
+          <a:lstStyle/>
+          <a:p>
+            <a:pPr algn="ctr"/>
+            <a:r>
+              <a:rPr lang="en-US" dirty="0" smtClean="0"/>
+              <a:t>TCP</a:t>
+            </a:r>
+            <a:endParaRPr lang="en-US" dirty="0"/>
+          </a:p>
+        </p:txBody>
+      </p:sp>
+      <p:sp>
+        <p:nvSpPr>
+          <p:cNvPr id="29" name="Double Bracket 28"/>
+          <p:cNvSpPr/>
+          <p:nvPr/>
+        </p:nvSpPr>
+        <p:spPr>
+          <a:xfrm>
+            <a:off x="7236177" y="5887176"/>
+            <a:ext cx="479778" cy="188491"/>
+          </a:xfrm>
+          <a:prstGeom prst="bracketPair">
+            <a:avLst/>
+          </a:prstGeom>
+        </p:spPr>
+        <p:style>
+          <a:lnRef idx="1">
+            <a:schemeClr val="dk1"/>
+          </a:lnRef>
+          <a:fillRef idx="0">
+            <a:schemeClr val="dk1"/>
+          </a:fillRef>
+          <a:effectRef idx="0">
+            <a:schemeClr val="dk1"/>
+          </a:effectRef>
+          <a:fontRef idx="minor">
+            <a:schemeClr val="tx1"/>
+          </a:fontRef>
+        </p:style>
+        <p:txBody>
+          <a:bodyPr rtlCol="0" anchor="b"/>
+          <a:lstStyle/>
+          <a:p>
+            <a:pPr algn="ctr"/>
+            <a:r>
+              <a:rPr lang="en-US" b="1" dirty="0" smtClean="0"/>
+              <a:t>…</a:t>
+            </a:r>
+            <a:endParaRPr lang="en-US" b="1" dirty="0"/>
+          </a:p>
+        </p:txBody>
+      </p:sp>
+      <p:sp>
+        <p:nvSpPr>
+          <p:cNvPr id="32" name="Left-Right Arrow 31"/>
+          <p:cNvSpPr/>
+          <p:nvPr/>
+        </p:nvSpPr>
+        <p:spPr>
+          <a:xfrm>
+            <a:off x="4007557" y="4885835"/>
+            <a:ext cx="1165574" cy="254000"/>
           </a:xfrm>
           <a:prstGeom prst="leftRightArrow">
             <a:avLst/>
@@ -7699,14 +7325,96 @@
       </p:sp>
       <p:sp>
         <p:nvSpPr>
-          <p:cNvPr id="11" name="Left-Right Arrow 10"/>
+          <p:cNvPr id="33" name="Oval 32"/>
           <p:cNvSpPr/>
           <p:nvPr/>
         </p:nvSpPr>
         <p:spPr>
-          <a:xfrm rot="2695864">
-            <a:off x="1735667" y="4586106"/>
-            <a:ext cx="747892" cy="324556"/>
+          <a:xfrm>
+            <a:off x="2850445" y="4758834"/>
+            <a:ext cx="1078088" cy="508000"/>
+          </a:xfrm>
+          <a:prstGeom prst="ellipse">
+            <a:avLst/>
+          </a:prstGeom>
+          <a:ln/>
+        </p:spPr>
+        <p:style>
+          <a:lnRef idx="2">
+            <a:schemeClr val="accent3">
+              <a:shade val="50000"/>
+            </a:schemeClr>
+          </a:lnRef>
+          <a:fillRef idx="1">
+            <a:schemeClr val="accent3"/>
+          </a:fillRef>
+          <a:effectRef idx="0">
+            <a:schemeClr val="accent3"/>
+          </a:effectRef>
+          <a:fontRef idx="minor">
+            <a:schemeClr val="lt1"/>
+          </a:fontRef>
+        </p:style>
+        <p:txBody>
+          <a:bodyPr rtlCol="0" anchor="ctr"/>
+          <a:lstStyle/>
+          <a:p>
+            <a:pPr algn="ctr"/>
+            <a:endParaRPr lang="en-US" dirty="0"/>
+          </a:p>
+        </p:txBody>
+      </p:sp>
+      <p:sp>
+        <p:nvSpPr>
+          <p:cNvPr id="34" name="Oval 33"/>
+          <p:cNvSpPr/>
+          <p:nvPr/>
+        </p:nvSpPr>
+        <p:spPr>
+          <a:xfrm>
+            <a:off x="5229575" y="4758835"/>
+            <a:ext cx="1078088" cy="508000"/>
+          </a:xfrm>
+          <a:prstGeom prst="ellipse">
+            <a:avLst/>
+          </a:prstGeom>
+          <a:ln/>
+        </p:spPr>
+        <p:style>
+          <a:lnRef idx="2">
+            <a:schemeClr val="accent3">
+              <a:shade val="50000"/>
+            </a:schemeClr>
+          </a:lnRef>
+          <a:fillRef idx="1">
+            <a:schemeClr val="accent3"/>
+          </a:fillRef>
+          <a:effectRef idx="0">
+            <a:schemeClr val="accent3"/>
+          </a:effectRef>
+          <a:fontRef idx="minor">
+            <a:schemeClr val="lt1"/>
+          </a:fontRef>
+        </p:style>
+        <p:txBody>
+          <a:bodyPr rtlCol="0" anchor="ctr"/>
+          <a:lstStyle/>
+          <a:p>
+            <a:pPr algn="ctr"/>
+            <a:endParaRPr lang="en-US" dirty="0"/>
+          </a:p>
+        </p:txBody>
+      </p:sp>
+      <p:sp>
+        <p:nvSpPr>
+          <p:cNvPr id="35" name="Left-Right Arrow 34"/>
+          <p:cNvSpPr/>
+          <p:nvPr/>
+        </p:nvSpPr>
+        <p:spPr>
+          <a:xfrm rot="2446395">
+            <a:off x="6237355" y="5294616"/>
+            <a:ext cx="1107610" cy="395569"/>
           </a:xfrm>
           <a:prstGeom prst="leftRightArrow">
             <a:avLst/>
@@ -7751,14 +7459,14 @@
       </p:sp>
       <p:sp>
         <p:nvSpPr>
-          <p:cNvPr id="12" name="Left-Right Arrow 11"/>
+          <p:cNvPr id="36" name="Left-Right Arrow 35"/>
           <p:cNvSpPr/>
           <p:nvPr/>
         </p:nvSpPr>
         <p:spPr>
-          <a:xfrm rot="19392402">
-            <a:off x="6493931" y="4473218"/>
-            <a:ext cx="747892" cy="324556"/>
+          <a:xfrm rot="19158177">
+            <a:off x="6245916" y="4481447"/>
+            <a:ext cx="1165849" cy="371739"/>
           </a:xfrm>
           <a:prstGeom prst="leftRightArrow">
             <a:avLst/>
@@ -7801,153 +7509,168 @@
           </a:p>
         </p:txBody>
       </p:sp>
-      <p:cxnSp>
-        <p:nvCxnSpPr>
-          <p:cNvPr id="13" name="Straight Arrow Connector 12"/>
-          <p:cNvCxnSpPr/>
+      <p:grpSp>
+        <p:nvGrpSpPr>
+          <p:cNvPr id="44" name="Group 43"/>
+          <p:cNvGrpSpPr/>
           <p:nvPr/>
-        </p:nvCxnSpPr>
-        <p:spPr>
-          <a:xfrm flipH="1" flipV="1">
-            <a:off x="4210753" y="4247436"/>
-            <a:ext cx="14112" cy="437445"/>
+        </p:nvGrpSpPr>
+        <p:grpSpPr>
+          <a:xfrm>
+            <a:off x="4253087" y="3960170"/>
+            <a:ext cx="793045" cy="708000"/>
+            <a:chOff x="4196643" y="3062112"/>
+            <a:chExt cx="793045" cy="708000"/>
           </a:xfrm>
-          <a:prstGeom prst="straightConnector1">
-            <a:avLst/>
-          </a:prstGeom>
-          <a:ln>
-            <a:solidFill>
-              <a:srgbClr val="000000"/>
-            </a:solidFill>
-            <a:tailEnd type="arrow"/>
-          </a:ln>
-        </p:spPr>
-        <p:style>
-          <a:lnRef idx="1">
-            <a:schemeClr val="dk1"/>
-          </a:lnRef>
-          <a:fillRef idx="0">
-            <a:schemeClr val="dk1"/>
-          </a:fillRef>
-          <a:effectRef idx="0">
-            <a:schemeClr val="dk1"/>
-          </a:effectRef>
-          <a:fontRef idx="minor">
-            <a:schemeClr val="tx1"/>
-          </a:fontRef>
-        </p:style>
-      </p:cxnSp>
-      <p:cxnSp>
-        <p:nvCxnSpPr>
-          <p:cNvPr id="14" name="Straight Arrow Connector 13"/>
-          <p:cNvCxnSpPr/>
-          <p:nvPr/>
-        </p:nvCxnSpPr>
-        <p:spPr>
-          <a:xfrm>
-            <a:off x="4196643" y="4656659"/>
-            <a:ext cx="793045" cy="0"/>
-          </a:xfrm>
-          <a:prstGeom prst="straightConnector1">
-            <a:avLst/>
-          </a:prstGeom>
-          <a:ln>
-            <a:solidFill>
-              <a:srgbClr val="000000"/>
-            </a:solidFill>
-            <a:tailEnd type="arrow"/>
-          </a:ln>
-        </p:spPr>
-        <p:style>
-          <a:lnRef idx="1">
-            <a:schemeClr val="dk1"/>
-          </a:lnRef>
-          <a:fillRef idx="0">
-            <a:schemeClr val="dk1"/>
-          </a:fillRef>
-          <a:effectRef idx="0">
-            <a:schemeClr val="dk1"/>
-          </a:effectRef>
-          <a:fontRef idx="minor">
-            <a:schemeClr val="tx1"/>
-          </a:fontRef>
-        </p:style>
-      </p:cxnSp>
-      <p:cxnSp>
-        <p:nvCxnSpPr>
-          <p:cNvPr id="15" name="Straight Connector 14"/>
-          <p:cNvCxnSpPr/>
-          <p:nvPr/>
-        </p:nvCxnSpPr>
-        <p:spPr>
-          <a:xfrm>
-            <a:off x="4224865" y="4444991"/>
-            <a:ext cx="615246" cy="0"/>
-          </a:xfrm>
-          <a:prstGeom prst="line">
-            <a:avLst/>
-          </a:prstGeom>
-          <a:ln w="38100" cmpd="sng">
-            <a:solidFill>
-              <a:schemeClr val="tx2"/>
-            </a:solidFill>
-          </a:ln>
-        </p:spPr>
-        <p:style>
-          <a:lnRef idx="1">
-            <a:schemeClr val="accent1"/>
-          </a:lnRef>
-          <a:fillRef idx="0">
-            <a:schemeClr val="accent1"/>
-          </a:fillRef>
-          <a:effectRef idx="0">
-            <a:schemeClr val="accent1"/>
-          </a:effectRef>
-          <a:fontRef idx="minor">
-            <a:schemeClr val="tx1"/>
-          </a:fontRef>
-        </p:style>
-      </p:cxnSp>
-      <p:sp>
-        <p:nvSpPr>
-          <p:cNvPr id="16" name="TextBox 15"/>
-          <p:cNvSpPr txBox="1"/>
-          <p:nvPr/>
-        </p:nvSpPr>
-        <p:spPr>
-          <a:xfrm>
-            <a:off x="4322020" y="4586104"/>
-            <a:ext cx="518091" cy="369332"/>
-          </a:xfrm>
-          <a:prstGeom prst="rect">
-            <a:avLst/>
-          </a:prstGeom>
-          <a:noFill/>
-        </p:spPr>
-        <p:txBody>
-          <a:bodyPr wrap="none" rtlCol="0">
-            <a:spAutoFit/>
-          </a:bodyPr>
-          <a:lstStyle/>
-          <a:p>
-            <a:r>
-              <a:rPr lang="en-US" dirty="0" smtClean="0"/>
-              <a:t>BW</a:t>
-            </a:r>
-            <a:endParaRPr lang="en-US" dirty="0"/>
-          </a:p>
-        </p:txBody>
-      </p:sp>
-      <p:sp>
-        <p:nvSpPr>
-          <p:cNvPr id="17" name="Left-Right Arrow 16"/>
+        </p:grpSpPr>
+        <p:cxnSp>
+          <p:nvCxnSpPr>
+            <p:cNvPr id="45" name="Straight Arrow Connector 44"/>
+            <p:cNvCxnSpPr/>
+            <p:nvPr/>
+          </p:nvCxnSpPr>
+          <p:spPr>
+            <a:xfrm flipH="1" flipV="1">
+              <a:off x="4210753" y="3062112"/>
+              <a:ext cx="14112" cy="437445"/>
+            </a:xfrm>
+            <a:prstGeom prst="straightConnector1">
+              <a:avLst/>
+            </a:prstGeom>
+            <a:ln>
+              <a:solidFill>
+                <a:srgbClr val="000000"/>
+              </a:solidFill>
+              <a:tailEnd type="arrow"/>
+            </a:ln>
+          </p:spPr>
+          <p:style>
+            <a:lnRef idx="1">
+              <a:schemeClr val="dk1"/>
+            </a:lnRef>
+            <a:fillRef idx="0">
+              <a:schemeClr val="dk1"/>
+            </a:fillRef>
+            <a:effectRef idx="0">
+              <a:schemeClr val="dk1"/>
+            </a:effectRef>
+            <a:fontRef idx="minor">
+              <a:schemeClr val="tx1"/>
+            </a:fontRef>
+          </p:style>
+        </p:cxnSp>
+        <p:cxnSp>
+          <p:nvCxnSpPr>
+            <p:cNvPr id="46" name="Straight Arrow Connector 45"/>
+            <p:cNvCxnSpPr/>
+            <p:nvPr/>
+          </p:nvCxnSpPr>
+          <p:spPr>
+            <a:xfrm>
+              <a:off x="4196643" y="3471335"/>
+              <a:ext cx="793045" cy="0"/>
+            </a:xfrm>
+            <a:prstGeom prst="straightConnector1">
+              <a:avLst/>
+            </a:prstGeom>
+            <a:ln>
+              <a:solidFill>
+                <a:srgbClr val="000000"/>
+              </a:solidFill>
+              <a:tailEnd type="arrow"/>
+            </a:ln>
+          </p:spPr>
+          <p:style>
+            <a:lnRef idx="1">
+              <a:schemeClr val="dk1"/>
+            </a:lnRef>
+            <a:fillRef idx="0">
+              <a:schemeClr val="dk1"/>
+            </a:fillRef>
+            <a:effectRef idx="0">
+              <a:schemeClr val="dk1"/>
+            </a:effectRef>
+            <a:fontRef idx="minor">
+              <a:schemeClr val="tx1"/>
+            </a:fontRef>
+          </p:style>
+        </p:cxnSp>
+        <p:cxnSp>
+          <p:nvCxnSpPr>
+            <p:cNvPr id="47" name="Straight Connector 46"/>
+            <p:cNvCxnSpPr/>
+            <p:nvPr/>
+          </p:nvCxnSpPr>
+          <p:spPr>
+            <a:xfrm>
+              <a:off x="4224865" y="3259667"/>
+              <a:ext cx="615246" cy="0"/>
+            </a:xfrm>
+            <a:prstGeom prst="line">
+              <a:avLst/>
+            </a:prstGeom>
+            <a:ln w="38100" cmpd="sng">
+              <a:solidFill>
+                <a:schemeClr val="tx2"/>
+              </a:solidFill>
+            </a:ln>
+          </p:spPr>
+          <p:style>
+            <a:lnRef idx="1">
+              <a:schemeClr val="accent1"/>
+            </a:lnRef>
+            <a:fillRef idx="0">
+              <a:schemeClr val="accent1"/>
+            </a:fillRef>
+            <a:effectRef idx="0">
+              <a:schemeClr val="accent1"/>
+            </a:effectRef>
+            <a:fontRef idx="minor">
+              <a:schemeClr val="tx1"/>
+            </a:fontRef>
+          </p:style>
+        </p:cxnSp>
+        <p:sp>
+          <p:nvSpPr>
+            <p:cNvPr id="48" name="TextBox 47"/>
+            <p:cNvSpPr txBox="1"/>
+            <p:nvPr/>
+          </p:nvSpPr>
+          <p:spPr>
+            <a:xfrm>
+              <a:off x="4322020" y="3400780"/>
+              <a:ext cx="518091" cy="369332"/>
+            </a:xfrm>
+            <a:prstGeom prst="rect">
+              <a:avLst/>
+            </a:prstGeom>
+            <a:noFill/>
+          </p:spPr>
+          <p:txBody>
+            <a:bodyPr wrap="none" rtlCol="0">
+              <a:spAutoFit/>
+            </a:bodyPr>
+            <a:lstStyle/>
+            <a:p>
+              <a:r>
+                <a:rPr lang="en-US" dirty="0" smtClean="0"/>
+                <a:t>BW</a:t>
+              </a:r>
+              <a:endParaRPr lang="en-US" dirty="0"/>
+            </a:p>
+          </p:txBody>
+        </p:sp>
+      </p:grpSp>
+      <p:sp>
+        <p:nvSpPr>
+          <p:cNvPr id="49" name="Left-Right Arrow 48"/>
           <p:cNvSpPr/>
           <p:nvPr/>
         </p:nvSpPr>
         <p:spPr>
-          <a:xfrm rot="19392402">
-            <a:off x="1760699" y="5435057"/>
-            <a:ext cx="747892" cy="324556"/>
+          <a:xfrm rot="2446395">
+            <a:off x="1773242" y="4489516"/>
+            <a:ext cx="1107610" cy="395569"/>
           </a:xfrm>
           <a:prstGeom prst="leftRightArrow">
             <a:avLst/>
@@ -7992,14 +7715,14 @@
       </p:sp>
       <p:sp>
         <p:nvSpPr>
-          <p:cNvPr id="18" name="Left-Right Arrow 17"/>
+          <p:cNvPr id="50" name="Left-Right Arrow 49"/>
           <p:cNvSpPr/>
           <p:nvPr/>
         </p:nvSpPr>
         <p:spPr>
-          <a:xfrm rot="2695864">
-            <a:off x="6521914" y="5297104"/>
-            <a:ext cx="747892" cy="324556"/>
+          <a:xfrm rot="19158177">
+            <a:off x="1739672" y="5328122"/>
+            <a:ext cx="1165849" cy="371739"/>
           </a:xfrm>
           <a:prstGeom prst="leftRightArrow">
             <a:avLst/>
@@ -8042,452 +7765,6 @@
           </a:p>
         </p:txBody>
       </p:sp>
-      <p:sp>
-        <p:nvSpPr>
-          <p:cNvPr id="19" name="Oval 18"/>
-          <p:cNvSpPr/>
-          <p:nvPr/>
-        </p:nvSpPr>
-        <p:spPr>
-          <a:xfrm>
-            <a:off x="6513560" y="3515662"/>
-            <a:ext cx="776111" cy="733777"/>
-          </a:xfrm>
-          <a:prstGeom prst="ellipse">
-            <a:avLst/>
-          </a:prstGeom>
-          <a:ln/>
-        </p:spPr>
-        <p:style>
-          <a:lnRef idx="2">
-            <a:schemeClr val="accent2">
-              <a:shade val="50000"/>
-            </a:schemeClr>
-          </a:lnRef>
-          <a:fillRef idx="1">
-            <a:schemeClr val="accent2"/>
-          </a:fillRef>
-          <a:effectRef idx="0">
-            <a:schemeClr val="accent2"/>
-          </a:effectRef>
-          <a:fontRef idx="minor">
-            <a:schemeClr val="lt1"/>
-          </a:fontRef>
-        </p:style>
-        <p:txBody>
-          <a:bodyPr rtlCol="0" anchor="ctr"/>
-          <a:lstStyle/>
-          <a:p>
-            <a:pPr algn="ctr"/>
-            <a:r>
-              <a:rPr lang="en-US" dirty="0" smtClean="0"/>
-              <a:t>RTP</a:t>
-            </a:r>
-            <a:endParaRPr lang="en-US" dirty="0"/>
-          </a:p>
-        </p:txBody>
-      </p:sp>
-      <p:sp>
-        <p:nvSpPr>
-          <p:cNvPr id="20" name="Oval 19"/>
-          <p:cNvSpPr/>
-          <p:nvPr/>
-        </p:nvSpPr>
-        <p:spPr>
-          <a:xfrm>
-            <a:off x="1002373" y="4406058"/>
-            <a:ext cx="776111" cy="733777"/>
-          </a:xfrm>
-          <a:prstGeom prst="ellipse">
-            <a:avLst/>
-          </a:prstGeom>
-          <a:ln/>
-        </p:spPr>
-        <p:style>
-          <a:lnRef idx="2">
-            <a:schemeClr val="accent2">
-              <a:shade val="50000"/>
-            </a:schemeClr>
-          </a:lnRef>
-          <a:fillRef idx="1">
-            <a:schemeClr val="accent2"/>
-          </a:fillRef>
-          <a:effectRef idx="0">
-            <a:schemeClr val="accent2"/>
-          </a:effectRef>
-          <a:fontRef idx="minor">
-            <a:schemeClr val="lt1"/>
-          </a:fontRef>
-        </p:style>
-        <p:txBody>
-          <a:bodyPr rtlCol="0" anchor="ctr"/>
-          <a:lstStyle/>
-          <a:p>
-            <a:pPr algn="ctr"/>
-            <a:r>
-              <a:rPr lang="en-US" dirty="0" smtClean="0"/>
-              <a:t>RTP</a:t>
-            </a:r>
-            <a:endParaRPr lang="en-US" dirty="0"/>
-          </a:p>
-        </p:txBody>
-      </p:sp>
-      <p:sp>
-        <p:nvSpPr>
-          <p:cNvPr id="21" name="Double Bracket 20"/>
-          <p:cNvSpPr/>
-          <p:nvPr/>
-        </p:nvSpPr>
-        <p:spPr>
-          <a:xfrm>
-            <a:off x="7346115" y="3960170"/>
-            <a:ext cx="479778" cy="188491"/>
-          </a:xfrm>
-          <a:prstGeom prst="bracketPair">
-            <a:avLst/>
-          </a:prstGeom>
-        </p:spPr>
-        <p:style>
-          <a:lnRef idx="1">
-            <a:schemeClr val="dk1"/>
-          </a:lnRef>
-          <a:fillRef idx="0">
-            <a:schemeClr val="dk1"/>
-          </a:fillRef>
-          <a:effectRef idx="0">
-            <a:schemeClr val="dk1"/>
-          </a:effectRef>
-          <a:fontRef idx="minor">
-            <a:schemeClr val="tx1"/>
-          </a:fontRef>
-        </p:style>
-        <p:txBody>
-          <a:bodyPr rtlCol="0" anchor="b"/>
-          <a:lstStyle/>
-          <a:p>
-            <a:pPr algn="ctr"/>
-            <a:r>
-              <a:rPr lang="en-US" b="1" dirty="0" smtClean="0"/>
-              <a:t>…</a:t>
-            </a:r>
-            <a:endParaRPr lang="en-US" b="1" dirty="0"/>
-          </a:p>
-        </p:txBody>
-      </p:sp>
-      <p:sp>
-        <p:nvSpPr>
-          <p:cNvPr id="22" name="Double Bracket 21"/>
-          <p:cNvSpPr/>
-          <p:nvPr/>
-        </p:nvSpPr>
-        <p:spPr>
-          <a:xfrm>
-            <a:off x="1145329" y="4124455"/>
-            <a:ext cx="479778" cy="188491"/>
-          </a:xfrm>
-          <a:prstGeom prst="bracketPair">
-            <a:avLst/>
-          </a:prstGeom>
-        </p:spPr>
-        <p:style>
-          <a:lnRef idx="1">
-            <a:schemeClr val="dk1"/>
-          </a:lnRef>
-          <a:fillRef idx="0">
-            <a:schemeClr val="dk1"/>
-          </a:fillRef>
-          <a:effectRef idx="0">
-            <a:schemeClr val="dk1"/>
-          </a:effectRef>
-          <a:fontRef idx="minor">
-            <a:schemeClr val="tx1"/>
-          </a:fontRef>
-        </p:style>
-        <p:txBody>
-          <a:bodyPr rtlCol="0" anchor="b"/>
-          <a:lstStyle/>
-          <a:p>
-            <a:pPr algn="ctr"/>
-            <a:r>
-              <a:rPr lang="en-US" b="1" dirty="0" smtClean="0"/>
-              <a:t>…</a:t>
-            </a:r>
-            <a:endParaRPr lang="en-US" b="1" dirty="0"/>
-          </a:p>
-        </p:txBody>
-      </p:sp>
-      <p:sp>
-        <p:nvSpPr>
-          <p:cNvPr id="24" name="Snip Same Side Corner Rectangle 23"/>
-          <p:cNvSpPr/>
-          <p:nvPr/>
-        </p:nvSpPr>
-        <p:spPr>
-          <a:xfrm>
-            <a:off x="956483" y="5369271"/>
-            <a:ext cx="776111" cy="493889"/>
-          </a:xfrm>
-          <a:prstGeom prst="snip2SameRect">
-            <a:avLst>
-              <a:gd name="adj1" fmla="val 50000"/>
-              <a:gd name="adj2" fmla="val 50000"/>
-            </a:avLst>
-          </a:prstGeom>
-        </p:spPr>
-        <p:style>
-          <a:lnRef idx="2">
-            <a:schemeClr val="accent4">
-              <a:shade val="50000"/>
-            </a:schemeClr>
-          </a:lnRef>
-          <a:fillRef idx="1">
-            <a:schemeClr val="accent4"/>
-          </a:fillRef>
-          <a:effectRef idx="0">
-            <a:schemeClr val="accent4"/>
-          </a:effectRef>
-          <a:fontRef idx="minor">
-            <a:schemeClr val="lt1"/>
-          </a:fontRef>
-        </p:style>
-        <p:txBody>
-          <a:bodyPr rtlCol="0" anchor="ctr"/>
-          <a:lstStyle/>
-          <a:p>
-            <a:pPr algn="ctr"/>
-            <a:r>
-              <a:rPr lang="en-US" dirty="0" smtClean="0"/>
-              <a:t>TCP</a:t>
-            </a:r>
-            <a:endParaRPr lang="en-US" dirty="0"/>
-          </a:p>
-        </p:txBody>
-      </p:sp>
-      <p:sp>
-        <p:nvSpPr>
-          <p:cNvPr id="25" name="Snip Same Side Corner Rectangle 24"/>
-          <p:cNvSpPr/>
-          <p:nvPr/>
-        </p:nvSpPr>
-        <p:spPr>
-          <a:xfrm>
-            <a:off x="1404539" y="6180653"/>
-            <a:ext cx="776111" cy="493889"/>
-          </a:xfrm>
-          <a:prstGeom prst="snip2SameRect">
-            <a:avLst>
-              <a:gd name="adj1" fmla="val 50000"/>
-              <a:gd name="adj2" fmla="val 50000"/>
-            </a:avLst>
-          </a:prstGeom>
-        </p:spPr>
-        <p:style>
-          <a:lnRef idx="2">
-            <a:schemeClr val="accent4">
-              <a:shade val="50000"/>
-            </a:schemeClr>
-          </a:lnRef>
-          <a:fillRef idx="1">
-            <a:schemeClr val="accent4"/>
-          </a:fillRef>
-          <a:effectRef idx="0">
-            <a:schemeClr val="accent4"/>
-          </a:effectRef>
-          <a:fontRef idx="minor">
-            <a:schemeClr val="lt1"/>
-          </a:fontRef>
-        </p:style>
-        <p:txBody>
-          <a:bodyPr rtlCol="0" anchor="ctr"/>
-          <a:lstStyle/>
-          <a:p>
-            <a:pPr algn="ctr"/>
-            <a:r>
-              <a:rPr lang="en-US" dirty="0" smtClean="0"/>
-              <a:t>TCP</a:t>
-            </a:r>
-            <a:endParaRPr lang="en-US" dirty="0"/>
-          </a:p>
-        </p:txBody>
-      </p:sp>
-      <p:sp>
-        <p:nvSpPr>
-          <p:cNvPr id="26" name="Double Bracket 25"/>
-          <p:cNvSpPr/>
-          <p:nvPr/>
-        </p:nvSpPr>
-        <p:spPr>
-          <a:xfrm>
-            <a:off x="1270968" y="5945300"/>
-            <a:ext cx="479778" cy="188491"/>
-          </a:xfrm>
-          <a:prstGeom prst="bracketPair">
-            <a:avLst/>
-          </a:prstGeom>
-        </p:spPr>
-        <p:style>
-          <a:lnRef idx="1">
-            <a:schemeClr val="dk1"/>
-          </a:lnRef>
-          <a:fillRef idx="0">
-            <a:schemeClr val="dk1"/>
-          </a:fillRef>
-          <a:effectRef idx="0">
-            <a:schemeClr val="dk1"/>
-          </a:effectRef>
-          <a:fontRef idx="minor">
-            <a:schemeClr val="tx1"/>
-          </a:fontRef>
-        </p:style>
-        <p:txBody>
-          <a:bodyPr rtlCol="0" anchor="b"/>
-          <a:lstStyle/>
-          <a:p>
-            <a:pPr algn="ctr"/>
-            <a:r>
-              <a:rPr lang="en-US" b="1" dirty="0" smtClean="0"/>
-              <a:t>…</a:t>
-            </a:r>
-            <a:endParaRPr lang="en-US" b="1" dirty="0"/>
-          </a:p>
-        </p:txBody>
-      </p:sp>
-      <p:sp>
-        <p:nvSpPr>
-          <p:cNvPr id="27" name="Snip Same Side Corner Rectangle 26"/>
-          <p:cNvSpPr/>
-          <p:nvPr/>
-        </p:nvSpPr>
-        <p:spPr>
-          <a:xfrm>
-            <a:off x="7335082" y="5243415"/>
-            <a:ext cx="776111" cy="493889"/>
-          </a:xfrm>
-          <a:prstGeom prst="snip2SameRect">
-            <a:avLst>
-              <a:gd name="adj1" fmla="val 50000"/>
-              <a:gd name="adj2" fmla="val 50000"/>
-            </a:avLst>
-          </a:prstGeom>
-        </p:spPr>
-        <p:style>
-          <a:lnRef idx="2">
-            <a:schemeClr val="accent4">
-              <a:shade val="50000"/>
-            </a:schemeClr>
-          </a:lnRef>
-          <a:fillRef idx="1">
-            <a:schemeClr val="accent4"/>
-          </a:fillRef>
-          <a:effectRef idx="0">
-            <a:schemeClr val="accent4"/>
-          </a:effectRef>
-          <a:fontRef idx="minor">
-            <a:schemeClr val="lt1"/>
-          </a:fontRef>
-        </p:style>
-        <p:txBody>
-          <a:bodyPr rtlCol="0" anchor="ctr"/>
-          <a:lstStyle/>
-          <a:p>
-            <a:pPr algn="ctr"/>
-            <a:r>
-              <a:rPr lang="en-US" dirty="0" smtClean="0"/>
-              <a:t>TCP</a:t>
-            </a:r>
-            <a:endParaRPr lang="en-US" dirty="0"/>
-          </a:p>
-        </p:txBody>
-      </p:sp>
-      <p:sp>
-        <p:nvSpPr>
-          <p:cNvPr id="28" name="Snip Same Side Corner Rectangle 27"/>
-          <p:cNvSpPr/>
-          <p:nvPr/>
-        </p:nvSpPr>
-        <p:spPr>
-          <a:xfrm>
-            <a:off x="6615289" y="6126163"/>
-            <a:ext cx="776111" cy="493889"/>
-          </a:xfrm>
-          <a:prstGeom prst="snip2SameRect">
-            <a:avLst>
-              <a:gd name="adj1" fmla="val 50000"/>
-              <a:gd name="adj2" fmla="val 50000"/>
-            </a:avLst>
-          </a:prstGeom>
-        </p:spPr>
-        <p:style>
-          <a:lnRef idx="2">
-            <a:schemeClr val="accent4">
-              <a:shade val="50000"/>
-            </a:schemeClr>
-          </a:lnRef>
-          <a:fillRef idx="1">
-            <a:schemeClr val="accent4"/>
-          </a:fillRef>
-          <a:effectRef idx="0">
-            <a:schemeClr val="accent4"/>
-          </a:effectRef>
-          <a:fontRef idx="minor">
-            <a:schemeClr val="lt1"/>
-          </a:fontRef>
-        </p:style>
-        <p:txBody>
-          <a:bodyPr rtlCol="0" anchor="ctr"/>
-          <a:lstStyle/>
-          <a:p>
-            <a:pPr algn="ctr"/>
-            <a:r>
-              <a:rPr lang="en-US" dirty="0" smtClean="0"/>
-              <a:t>TCP</a:t>
-            </a:r>
-            <a:endParaRPr lang="en-US" dirty="0"/>
-          </a:p>
-        </p:txBody>
-      </p:sp>
-      <p:sp>
-        <p:nvSpPr>
-          <p:cNvPr id="29" name="Double Bracket 28"/>
-          <p:cNvSpPr/>
-          <p:nvPr/>
-        </p:nvSpPr>
-        <p:spPr>
-          <a:xfrm>
-            <a:off x="7236177" y="5887176"/>
-            <a:ext cx="479778" cy="188491"/>
-          </a:xfrm>
-          <a:prstGeom prst="bracketPair">
-            <a:avLst/>
-          </a:prstGeom>
-        </p:spPr>
-        <p:style>
-          <a:lnRef idx="1">
-            <a:schemeClr val="dk1"/>
-          </a:lnRef>
-          <a:fillRef idx="0">
-            <a:schemeClr val="dk1"/>
-          </a:fillRef>
-          <a:effectRef idx="0">
-            <a:schemeClr val="dk1"/>
-          </a:effectRef>
-          <a:fontRef idx="minor">
-            <a:schemeClr val="tx1"/>
-          </a:fontRef>
-        </p:style>
-        <p:txBody>
-          <a:bodyPr rtlCol="0" anchor="b"/>
-          <a:lstStyle/>
-          <a:p>
-            <a:pPr algn="ctr"/>
-            <a:r>
-              <a:rPr lang="en-US" b="1" dirty="0" smtClean="0"/>
-              <a:t>…</a:t>
-            </a:r>
-            <a:endParaRPr lang="en-US" b="1" dirty="0"/>
-          </a:p>
-        </p:txBody>
-      </p:sp>
     </p:spTree>
     <p:extLst>
       <p:ext uri="{BB962C8B-B14F-4D97-AF65-F5344CB8AC3E}">
@@ -8535,7 +7812,7 @@
           <a:p>
             <a:r>
               <a:rPr lang="en-US" dirty="0" smtClean="0"/>
-              <a:t>Topology</a:t>
+              <a:t>Open Issues</a:t>
             </a:r>
             <a:endParaRPr lang="en-US" dirty="0"/>
           </a:p>
@@ -8553,20 +7830,61 @@
         </p:nvSpPr>
         <p:spPr/>
         <p:txBody>
-          <a:bodyPr/>
-          <a:lstStyle/>
-          <a:p>
-            <a:r>
-              <a:rPr lang="en-US" dirty="0" err="1" smtClean="0"/>
-              <a:t>Dumbell</a:t>
-            </a:r>
+          <a:bodyPr>
+            <a:normAutofit lnSpcReduction="10000"/>
+          </a:bodyPr>
+          <a:lstStyle/>
+          <a:p>
+            <a:r>
+              <a:rPr lang="en-US" dirty="0" smtClean="0"/>
+              <a:t>Other metrics?</a:t>
+            </a:r>
+          </a:p>
+          <a:p>
             <a:endParaRPr lang="en-US" dirty="0" smtClean="0"/>
           </a:p>
           <a:p>
             <a:r>
               <a:rPr lang="en-US" dirty="0" smtClean="0"/>
-              <a:t>Bus-stop</a:t>
-            </a:r>
+              <a:t>Clarify Topology: Dumbbell and Bus-stop</a:t>
+            </a:r>
+          </a:p>
+          <a:p>
+            <a:endParaRPr lang="en-US" dirty="0" smtClean="0"/>
+          </a:p>
+          <a:p>
+            <a:r>
+              <a:rPr lang="en-US" dirty="0" smtClean="0"/>
+              <a:t>Clarify </a:t>
+            </a:r>
+            <a:r>
+              <a:rPr lang="en-US" dirty="0"/>
+              <a:t>TCP </a:t>
+            </a:r>
+            <a:r>
+              <a:rPr lang="en-US" dirty="0" smtClean="0"/>
+              <a:t>and UDP flow parameters</a:t>
+            </a:r>
+          </a:p>
+          <a:p>
+            <a:endParaRPr lang="en-US" dirty="0" smtClean="0"/>
+          </a:p>
+          <a:p>
+            <a:r>
+              <a:rPr lang="en-US" dirty="0" smtClean="0"/>
+              <a:t>Define simulation/emulation parameters</a:t>
+            </a:r>
+          </a:p>
+          <a:p>
+            <a:pPr lvl="1"/>
+            <a:r>
+              <a:rPr lang="en-US" dirty="0" smtClean="0"/>
+              <a:t>Requirement document?</a:t>
+            </a:r>
+          </a:p>
+          <a:p>
+            <a:pPr lvl="1"/>
+            <a:endParaRPr lang="en-US" dirty="0" smtClean="0"/>
           </a:p>
           <a:p>
             <a:endParaRPr lang="en-US" dirty="0"/>

</xml_diff>